<commit_message>
added image for demo
</commit_message>
<xml_diff>
--- a/docs/Presentation_TeamGamma.pptx
+++ b/docs/Presentation_TeamGamma.pptx
@@ -372,7 +372,7 @@
     </p:spTree>
     <p:extLst>
       <p:ext uri="{BB962C8B-B14F-4D97-AF65-F5344CB8AC3E}">
-        <p14:creationId xmlns="" xmlns:p14="http://schemas.microsoft.com/office/powerpoint/2010/main" val="2212999972"/>
+        <p14:creationId xmlns:p14="http://schemas.microsoft.com/office/powerpoint/2010/main" xmlns="" val="2212999972"/>
       </p:ext>
     </p:extLst>
   </p:cSld>
@@ -574,19 +574,7 @@
                 <a:ea typeface="+mn-ea"/>
                 <a:cs typeface="+mn-cs"/>
               </a:rPr>
-              <a:t>Present </a:t>
-            </a:r>
-            <a:r>
-              <a:rPr lang="en-US" sz="1200" kern="1200" dirty="0" smtClean="0">
-                <a:solidFill>
-                  <a:schemeClr val="tx1"/>
-                </a:solidFill>
-                <a:effectLst/>
-                <a:latin typeface="+mn-lt"/>
-                <a:ea typeface="+mn-ea"/>
-                <a:cs typeface="+mn-cs"/>
-              </a:rPr>
-              <a:t>the project idea, its scope, the stakeholders, the problems the system addresses, economic benefits, whether it is an existing system that is to be improved or a new idea. </a:t>
+              <a:t>Present the project idea, its scope, the stakeholders, the problems the system addresses, economic benefits, whether it is an existing system that is to be improved or a new idea. </a:t>
             </a:r>
             <a:r>
               <a:rPr lang="en-US" sz="1200" b="1" kern="1200" dirty="0" smtClean="0">
@@ -612,15 +600,6 @@
               </a:rPr>
               <a:t>. The content presented here is what you have submitted for assign1.  </a:t>
             </a:r>
-            <a:endParaRPr lang="en-US" sz="1200" kern="1200" dirty="0" smtClean="0">
-              <a:solidFill>
-                <a:schemeClr val="tx1"/>
-              </a:solidFill>
-              <a:effectLst/>
-              <a:latin typeface="+mn-lt"/>
-              <a:ea typeface="+mn-ea"/>
-              <a:cs typeface="+mn-cs"/>
-            </a:endParaRPr>
           </a:p>
           <a:p>
             <a:pPr marL="0" marR="0" lvl="0" indent="0" algn="l" defTabSz="457200" rtl="0" eaLnBrk="1" fontAlgn="auto" latinLnBrk="0" hangingPunct="1">
@@ -682,7 +661,7 @@
     </p:spTree>
     <p:extLst>
       <p:ext uri="{BB962C8B-B14F-4D97-AF65-F5344CB8AC3E}">
-        <p14:creationId xmlns="" xmlns:p14="http://schemas.microsoft.com/office/powerpoint/2010/main" val="385254405"/>
+        <p14:creationId xmlns:p14="http://schemas.microsoft.com/office/powerpoint/2010/main" xmlns="" val="385254405"/>
       </p:ext>
     </p:extLst>
   </p:cSld>
@@ -8075,18 +8054,9 @@
           </a:p>
           <a:p>
             <a:r>
-              <a:rPr lang="en-US" dirty="0" err="1" smtClean="0"/>
-              <a:t>Poornima</a:t>
-            </a:r>
-            <a:r>
               <a:rPr lang="en-US" dirty="0" smtClean="0"/>
-              <a:t> </a:t>
-            </a:r>
-            <a:r>
-              <a:rPr lang="en-US" dirty="0" err="1" smtClean="0"/>
-              <a:t>Ganesan</a:t>
-            </a:r>
-            <a:endParaRPr lang="en-US" dirty="0" smtClean="0"/>
+              <a:t>Poornima Ganesan</a:t>
+            </a:r>
           </a:p>
           <a:p>
             <a:r>
@@ -8115,7 +8085,7 @@
     </p:spTree>
     <p:extLst>
       <p:ext uri="{BB962C8B-B14F-4D97-AF65-F5344CB8AC3E}">
-        <p14:creationId xmlns="" xmlns:p14="http://schemas.microsoft.com/office/powerpoint/2010/main" val="3291486969"/>
+        <p14:creationId xmlns:p14="http://schemas.microsoft.com/office/powerpoint/2010/main" xmlns="" val="3291486969"/>
       </p:ext>
     </p:extLst>
   </p:cSld>
@@ -8232,7 +8202,7 @@
     </p:spTree>
     <p:extLst>
       <p:ext uri="{BB962C8B-B14F-4D97-AF65-F5344CB8AC3E}">
-        <p14:creationId xmlns="" xmlns:p14="http://schemas.microsoft.com/office/powerpoint/2010/main" val="1195116925"/>
+        <p14:creationId xmlns:p14="http://schemas.microsoft.com/office/powerpoint/2010/main" xmlns="" val="1195116925"/>
       </p:ext>
     </p:extLst>
   </p:cSld>
@@ -8408,7 +8378,7 @@
     </p:spTree>
     <p:extLst>
       <p:ext uri="{BB962C8B-B14F-4D97-AF65-F5344CB8AC3E}">
-        <p14:creationId xmlns="" xmlns:p14="http://schemas.microsoft.com/office/powerpoint/2010/main" val="3853707377"/>
+        <p14:creationId xmlns:p14="http://schemas.microsoft.com/office/powerpoint/2010/main" xmlns="" val="3853707377"/>
       </p:ext>
     </p:extLst>
   </p:cSld>
@@ -8852,7 +8822,7 @@
     </p:spTree>
     <p:extLst>
       <p:ext uri="{BB962C8B-B14F-4D97-AF65-F5344CB8AC3E}">
-        <p14:creationId xmlns="" xmlns:p14="http://schemas.microsoft.com/office/powerpoint/2010/main" val="1948700834"/>
+        <p14:creationId xmlns:p14="http://schemas.microsoft.com/office/powerpoint/2010/main" xmlns="" val="1948700834"/>
       </p:ext>
     </p:extLst>
   </p:cSld>
@@ -8968,8 +8938,13 @@
           <a:p>
             <a:r>
               <a:rPr lang="en-US" dirty="0" smtClean="0"/>
-              <a:t>Current System Status</a:t>
-            </a:r>
+              <a:t>Current System </a:t>
+            </a:r>
+            <a:r>
+              <a:rPr lang="en-US" dirty="0" smtClean="0"/>
+              <a:t>Status &amp; Velocity</a:t>
+            </a:r>
+            <a:endParaRPr lang="en-US" dirty="0" smtClean="0"/>
           </a:p>
           <a:p>
             <a:r>
@@ -8994,7 +8969,7 @@
     </p:spTree>
     <p:extLst>
       <p:ext uri="{BB962C8B-B14F-4D97-AF65-F5344CB8AC3E}">
-        <p14:creationId xmlns="" xmlns:p14="http://schemas.microsoft.com/office/powerpoint/2010/main" val="1633817389"/>
+        <p14:creationId xmlns:p14="http://schemas.microsoft.com/office/powerpoint/2010/main" xmlns="" val="1633817389"/>
       </p:ext>
     </p:extLst>
   </p:cSld>
@@ -9214,7 +9189,7 @@
           <a:blip r:embed="rId3" cstate="print">
             <a:extLst>
               <a:ext uri="{28A0092B-C50C-407E-A947-70E740481C1C}">
-                <a14:useLocalDpi xmlns="" xmlns:a14="http://schemas.microsoft.com/office/drawing/2010/main" val="0"/>
+                <a14:useLocalDpi xmlns:a14="http://schemas.microsoft.com/office/drawing/2010/main" xmlns="" val="0"/>
               </a:ext>
             </a:extLst>
           </a:blip>
@@ -9239,7 +9214,7 @@
     </p:spTree>
     <p:extLst>
       <p:ext uri="{BB962C8B-B14F-4D97-AF65-F5344CB8AC3E}">
-        <p14:creationId xmlns="" xmlns:p14="http://schemas.microsoft.com/office/powerpoint/2010/main" val="1668180396"/>
+        <p14:creationId xmlns:p14="http://schemas.microsoft.com/office/powerpoint/2010/main" xmlns="" val="1668180396"/>
       </p:ext>
     </p:extLst>
   </p:cSld>
@@ -9273,38 +9248,36 @@
           <a:chExt cx="0" cy="0"/>
         </a:xfrm>
       </p:grpSpPr>
-      <p:sp>
-        <p:nvSpPr>
-          <p:cNvPr id="2" name="Title 1"/>
-          <p:cNvSpPr>
-            <a:spLocks noGrp="1"/>
-          </p:cNvSpPr>
-          <p:nvPr>
-            <p:ph type="title"/>
-          </p:nvPr>
-        </p:nvSpPr>
-        <p:spPr>
+      <p:pic>
+        <p:nvPicPr>
+          <p:cNvPr id="14338" name="Picture 2" descr="http://1.bp.blogspot.com/-WDaDuF-55Ts/UEeR4724BXI/AAAAAAAAA-A/yEgGwYCJ-3w/s1600/demo.jpg"/>
+          <p:cNvPicPr>
+            <a:picLocks noChangeAspect="1" noChangeArrowheads="1"/>
+          </p:cNvPicPr>
+          <p:nvPr/>
+        </p:nvPicPr>
+        <p:blipFill>
+          <a:blip r:embed="rId3" cstate="print"/>
+          <a:srcRect/>
+          <a:stretch>
+            <a:fillRect/>
+          </a:stretch>
+        </p:blipFill>
+        <p:spPr bwMode="auto">
           <a:xfrm>
-            <a:off x="457199" y="914400"/>
-            <a:ext cx="6508377" cy="3020818"/>
+            <a:off x="1255954" y="1557497"/>
+            <a:ext cx="5361823" cy="3866441"/>
           </a:xfrm>
+          <a:prstGeom prst="rect">
+            <a:avLst/>
+          </a:prstGeom>
+          <a:noFill/>
         </p:spPr>
-        <p:txBody>
-          <a:bodyPr/>
-          <a:lstStyle/>
-          <a:p>
-            <a:r>
-              <a:rPr lang="en-US" dirty="0" smtClean="0"/>
-              <a:t>Demo……</a:t>
-            </a:r>
-            <a:endParaRPr lang="en-US" dirty="0"/>
-          </a:p>
-        </p:txBody>
-      </p:sp>
+      </p:pic>
     </p:spTree>
     <p:extLst>
       <p:ext uri="{BB962C8B-B14F-4D97-AF65-F5344CB8AC3E}">
-        <p14:creationId xmlns="" xmlns:p14="http://schemas.microsoft.com/office/powerpoint/2010/main" val="928388685"/>
+        <p14:creationId xmlns:p14="http://schemas.microsoft.com/office/powerpoint/2010/main" xmlns="" val="928388685"/>
       </p:ext>
     </p:extLst>
   </p:cSld>
@@ -9399,13 +9372,13 @@
             <p:ph idx="1"/>
             <p:extLst>
               <p:ext uri="{D42A27DB-BD31-4B8C-83A1-F6EECF244321}">
-                <p14:modId xmlns="" xmlns:p14="http://schemas.microsoft.com/office/powerpoint/2010/main" val="3988399231"/>
+                <p14:modId xmlns:p14="http://schemas.microsoft.com/office/powerpoint/2010/main" xmlns="" val="3988399231"/>
               </p:ext>
             </p:extLst>
           </p:nvPr>
         </p:nvGraphicFramePr>
         <p:xfrm>
-          <a:off x="321733" y="275691"/>
+          <a:off x="244243" y="275691"/>
           <a:ext cx="6874902" cy="6421416"/>
         </p:xfrm>
         <a:graphic>
@@ -10565,7 +10538,7 @@
     </p:spTree>
     <p:extLst>
       <p:ext uri="{BB962C8B-B14F-4D97-AF65-F5344CB8AC3E}">
-        <p14:creationId xmlns="" xmlns:p14="http://schemas.microsoft.com/office/powerpoint/2010/main" val="1530510290"/>
+        <p14:creationId xmlns:p14="http://schemas.microsoft.com/office/powerpoint/2010/main" xmlns="" val="1530510290"/>
       </p:ext>
     </p:extLst>
   </p:cSld>
@@ -10658,7 +10631,7 @@
     </p:spTree>
     <p:extLst>
       <p:ext uri="{BB962C8B-B14F-4D97-AF65-F5344CB8AC3E}">
-        <p14:creationId xmlns="" xmlns:p14="http://schemas.microsoft.com/office/powerpoint/2010/main" val="1138632541"/>
+        <p14:creationId xmlns:p14="http://schemas.microsoft.com/office/powerpoint/2010/main" xmlns="" val="1138632541"/>
       </p:ext>
     </p:extLst>
   </p:cSld>
@@ -10764,7 +10737,7 @@
     </p:spTree>
     <p:extLst>
       <p:ext uri="{BB962C8B-B14F-4D97-AF65-F5344CB8AC3E}">
-        <p14:creationId xmlns="" xmlns:p14="http://schemas.microsoft.com/office/powerpoint/2010/main" val="1418101890"/>
+        <p14:creationId xmlns:p14="http://schemas.microsoft.com/office/powerpoint/2010/main" xmlns="" val="1418101890"/>
       </p:ext>
     </p:extLst>
   </p:cSld>
@@ -10836,7 +10809,7 @@
             <p:ph idx="1"/>
             <p:extLst>
               <p:ext uri="{D42A27DB-BD31-4B8C-83A1-F6EECF244321}">
-                <p14:modId xmlns="" xmlns:p14="http://schemas.microsoft.com/office/powerpoint/2010/main" val="2952445889"/>
+                <p14:modId xmlns:p14="http://schemas.microsoft.com/office/powerpoint/2010/main" xmlns="" val="2952445889"/>
               </p:ext>
             </p:extLst>
           </p:nvPr>
@@ -11670,7 +11643,15 @@
             </a:pPr>
             <a:r>
               <a:rPr lang="en-US" sz="1600" dirty="0" smtClean="0"/>
-              <a:t> Implemented core functionality first </a:t>
+              <a:t> </a:t>
+            </a:r>
+            <a:r>
+              <a:rPr lang="en-US" sz="1600" b="1" dirty="0" smtClean="0">
+                <a:solidFill>
+                  <a:schemeClr val="accent1"/>
+                </a:solidFill>
+              </a:rPr>
+              <a:t>Implemented core functionality first </a:t>
             </a:r>
           </a:p>
           <a:p>
@@ -11719,7 +11700,11 @@
               <a:buChar char="§"/>
             </a:pPr>
             <a:r>
-              <a:rPr lang="en-US" sz="1600" dirty="0" smtClean="0"/>
+              <a:rPr lang="en-US" sz="1600" b="1" dirty="0" smtClean="0">
+                <a:solidFill>
+                  <a:schemeClr val="accent1"/>
+                </a:solidFill>
+              </a:rPr>
               <a:t>Roadmap for future releases</a:t>
             </a:r>
           </a:p>
@@ -11765,7 +11750,7 @@
     </p:spTree>
     <p:extLst>
       <p:ext uri="{BB962C8B-B14F-4D97-AF65-F5344CB8AC3E}">
-        <p14:creationId xmlns="" xmlns:p14="http://schemas.microsoft.com/office/powerpoint/2010/main" val="83792608"/>
+        <p14:creationId xmlns:p14="http://schemas.microsoft.com/office/powerpoint/2010/main" xmlns="" val="83792608"/>
       </p:ext>
     </p:extLst>
   </p:cSld>

</xml_diff>

<commit_message>
ppt slide 3 and 7
</commit_message>
<xml_diff>
--- a/docs/Presentation_TeamGamma.pptx
+++ b/docs/Presentation_TeamGamma.pptx
@@ -121,7 +121,17 @@
 
 <file path=ppt/charts/chart1.xml><?xml version="1.0" encoding="utf-8"?>
 <c:chartSpace xmlns:c="http://schemas.openxmlformats.org/drawingml/2006/chart" xmlns:a="http://schemas.openxmlformats.org/drawingml/2006/main" xmlns:r="http://schemas.openxmlformats.org/officeDocument/2006/relationships">
+  <c:date1904 val="0"/>
   <c:lang val="en-US"/>
+  <c:roundedCorners val="0"/>
+  <mc:AlternateContent xmlns:mc="http://schemas.openxmlformats.org/markup-compatibility/2006">
+    <mc:Choice xmlns:c14="http://schemas.microsoft.com/office/drawing/2007/8/2/chart" Requires="c14">
+      <c14:style val="102"/>
+    </mc:Choice>
+    <mc:Fallback>
+      <c:style val="2"/>
+    </mc:Fallback>
+  </mc:AlternateContent>
   <c:chart>
     <c:title>
       <c:tx>
@@ -140,6 +150,7 @@
         </c:rich>
       </c:tx>
       <c:layout/>
+      <c:overlay val="0"/>
       <c:spPr>
         <a:noFill/>
         <a:ln w="25400">
@@ -147,20 +158,22 @@
         </a:ln>
       </c:spPr>
     </c:title>
+    <c:autoTitleDeleted val="0"/>
     <c:plotArea>
       <c:layout>
         <c:manualLayout>
           <c:layoutTarget val="inner"/>
           <c:xMode val="edge"/>
           <c:yMode val="edge"/>
-          <c:x val="0.12857427475030966"/>
-          <c:y val="0.13847709714251821"/>
-          <c:w val="0.8161094219658187"/>
-          <c:h val="0.7355285674036508"/>
+          <c:x val="0.12857427475031"/>
+          <c:y val="0.138477097142518"/>
+          <c:w val="0.816109421965819"/>
+          <c:h val="0.735528567403651"/>
         </c:manualLayout>
       </c:layout>
       <c:lineChart>
         <c:grouping val="standard"/>
+        <c:varyColors val="0"/>
         <c:ser>
           <c:idx val="0"/>
           <c:order val="0"/>
@@ -205,67 +218,67 @@
                 <c:formatCode>General</c:formatCode>
                 <c:ptCount val="21"/>
                 <c:pt idx="0">
-                  <c:v>1</c:v>
+                  <c:v>1.0</c:v>
                 </c:pt>
                 <c:pt idx="1">
-                  <c:v>2</c:v>
+                  <c:v>2.0</c:v>
                 </c:pt>
                 <c:pt idx="2">
-                  <c:v>3</c:v>
+                  <c:v>3.0</c:v>
                 </c:pt>
                 <c:pt idx="3">
-                  <c:v>4</c:v>
+                  <c:v>4.0</c:v>
                 </c:pt>
                 <c:pt idx="4">
-                  <c:v>5</c:v>
+                  <c:v>5.0</c:v>
                 </c:pt>
                 <c:pt idx="5">
-                  <c:v>6</c:v>
+                  <c:v>6.0</c:v>
                 </c:pt>
                 <c:pt idx="6">
-                  <c:v>7</c:v>
+                  <c:v>7.0</c:v>
                 </c:pt>
                 <c:pt idx="7">
-                  <c:v>8</c:v>
+                  <c:v>8.0</c:v>
                 </c:pt>
                 <c:pt idx="8">
-                  <c:v>9</c:v>
+                  <c:v>9.0</c:v>
                 </c:pt>
                 <c:pt idx="9">
-                  <c:v>10</c:v>
+                  <c:v>10.0</c:v>
                 </c:pt>
                 <c:pt idx="10">
-                  <c:v>11</c:v>
+                  <c:v>11.0</c:v>
                 </c:pt>
                 <c:pt idx="11">
-                  <c:v>12</c:v>
+                  <c:v>12.0</c:v>
                 </c:pt>
                 <c:pt idx="12">
-                  <c:v>13</c:v>
+                  <c:v>13.0</c:v>
                 </c:pt>
                 <c:pt idx="13">
-                  <c:v>14</c:v>
+                  <c:v>14.0</c:v>
                 </c:pt>
                 <c:pt idx="14">
-                  <c:v>15</c:v>
+                  <c:v>15.0</c:v>
                 </c:pt>
                 <c:pt idx="15">
-                  <c:v>16</c:v>
+                  <c:v>16.0</c:v>
                 </c:pt>
                 <c:pt idx="16">
-                  <c:v>17</c:v>
+                  <c:v>17.0</c:v>
                 </c:pt>
                 <c:pt idx="17">
-                  <c:v>18</c:v>
+                  <c:v>18.0</c:v>
                 </c:pt>
                 <c:pt idx="18">
-                  <c:v>19</c:v>
+                  <c:v>19.0</c:v>
                 </c:pt>
                 <c:pt idx="19">
-                  <c:v>20</c:v>
+                  <c:v>20.0</c:v>
                 </c:pt>
                 <c:pt idx="20">
-                  <c:v>21</c:v>
+                  <c:v>21.0</c:v>
                 </c:pt>
               </c:numCache>
             </c:numRef>
@@ -277,34 +290,34 @@
                 <c:formatCode>0.00</c:formatCode>
                 <c:ptCount val="21"/>
                 <c:pt idx="0">
-                  <c:v>37</c:v>
+                  <c:v>37.0</c:v>
                 </c:pt>
                 <c:pt idx="1">
-                  <c:v>35.238095238095241</c:v>
+                  <c:v>35.23809523809525</c:v>
                 </c:pt>
                 <c:pt idx="2">
-                  <c:v>33.476190476190474</c:v>
+                  <c:v>33.47619047619047</c:v>
                 </c:pt>
                 <c:pt idx="3">
-                  <c:v>31.714285714285715</c:v>
+                  <c:v>31.71428571428572</c:v>
                 </c:pt>
                 <c:pt idx="4">
-                  <c:v>29.952380952380953</c:v>
+                  <c:v>29.95238095238095</c:v>
                 </c:pt>
                 <c:pt idx="5">
                   <c:v>28.19047619047619</c:v>
                 </c:pt>
                 <c:pt idx="6">
-                  <c:v>26.428571428571431</c:v>
+                  <c:v>26.42857142857143</c:v>
                 </c:pt>
                 <c:pt idx="7">
-                  <c:v>24.666666666666668</c:v>
+                  <c:v>24.66666666666667</c:v>
                 </c:pt>
                 <c:pt idx="8">
-                  <c:v>22.904761904761905</c:v>
+                  <c:v>22.9047619047619</c:v>
                 </c:pt>
                 <c:pt idx="9">
-                  <c:v>21.142857142857142</c:v>
+                  <c:v>21.14285714285715</c:v>
                 </c:pt>
                 <c:pt idx="10">
                   <c:v>19.38095238095238</c:v>
@@ -313,35 +326,36 @@
                   <c:v>17.61904761904762</c:v>
                 </c:pt>
                 <c:pt idx="12">
-                  <c:v>15.857142857142858</c:v>
+                  <c:v>15.85714285714286</c:v>
                 </c:pt>
                 <c:pt idx="13">
-                  <c:v>14.095238095238095</c:v>
+                  <c:v>14.0952380952381</c:v>
                 </c:pt>
                 <c:pt idx="14">
-                  <c:v>12.333333333333336</c:v>
+                  <c:v>12.33333333333334</c:v>
                 </c:pt>
                 <c:pt idx="15">
-                  <c:v>10.571428571428573</c:v>
+                  <c:v>10.57142857142857</c:v>
                 </c:pt>
                 <c:pt idx="16">
-                  <c:v>8.8095238095238102</c:v>
+                  <c:v>8.80952380952381</c:v>
                 </c:pt>
                 <c:pt idx="17">
-                  <c:v>7.0476190476190474</c:v>
+                  <c:v>7.047619047619047</c:v>
                 </c:pt>
                 <c:pt idx="18">
-                  <c:v>5.2857142857142847</c:v>
+                  <c:v>5.285714285714285</c:v>
                 </c:pt>
                 <c:pt idx="19">
-                  <c:v>3.5238095238095255</c:v>
+                  <c:v>3.523809523809525</c:v>
                 </c:pt>
                 <c:pt idx="20">
-                  <c:v>1.7619047619047592</c:v>
+                  <c:v>1.761904761904759</c:v>
                 </c:pt>
               </c:numCache>
             </c:numRef>
           </c:val>
+          <c:smooth val="0"/>
         </c:ser>
         <c:ser>
           <c:idx val="1"/>
@@ -387,67 +401,67 @@
                 <c:formatCode>General</c:formatCode>
                 <c:ptCount val="21"/>
                 <c:pt idx="0">
-                  <c:v>1</c:v>
+                  <c:v>1.0</c:v>
                 </c:pt>
                 <c:pt idx="1">
-                  <c:v>2</c:v>
+                  <c:v>2.0</c:v>
                 </c:pt>
                 <c:pt idx="2">
-                  <c:v>3</c:v>
+                  <c:v>3.0</c:v>
                 </c:pt>
                 <c:pt idx="3">
-                  <c:v>4</c:v>
+                  <c:v>4.0</c:v>
                 </c:pt>
                 <c:pt idx="4">
-                  <c:v>5</c:v>
+                  <c:v>5.0</c:v>
                 </c:pt>
                 <c:pt idx="5">
-                  <c:v>6</c:v>
+                  <c:v>6.0</c:v>
                 </c:pt>
                 <c:pt idx="6">
-                  <c:v>7</c:v>
+                  <c:v>7.0</c:v>
                 </c:pt>
                 <c:pt idx="7">
-                  <c:v>8</c:v>
+                  <c:v>8.0</c:v>
                 </c:pt>
                 <c:pt idx="8">
-                  <c:v>9</c:v>
+                  <c:v>9.0</c:v>
                 </c:pt>
                 <c:pt idx="9">
-                  <c:v>10</c:v>
+                  <c:v>10.0</c:v>
                 </c:pt>
                 <c:pt idx="10">
-                  <c:v>11</c:v>
+                  <c:v>11.0</c:v>
                 </c:pt>
                 <c:pt idx="11">
-                  <c:v>12</c:v>
+                  <c:v>12.0</c:v>
                 </c:pt>
                 <c:pt idx="12">
-                  <c:v>13</c:v>
+                  <c:v>13.0</c:v>
                 </c:pt>
                 <c:pt idx="13">
-                  <c:v>14</c:v>
+                  <c:v>14.0</c:v>
                 </c:pt>
                 <c:pt idx="14">
-                  <c:v>15</c:v>
+                  <c:v>15.0</c:v>
                 </c:pt>
                 <c:pt idx="15">
-                  <c:v>16</c:v>
+                  <c:v>16.0</c:v>
                 </c:pt>
                 <c:pt idx="16">
-                  <c:v>17</c:v>
+                  <c:v>17.0</c:v>
                 </c:pt>
                 <c:pt idx="17">
-                  <c:v>18</c:v>
+                  <c:v>18.0</c:v>
                 </c:pt>
                 <c:pt idx="18">
-                  <c:v>19</c:v>
+                  <c:v>19.0</c:v>
                 </c:pt>
                 <c:pt idx="19">
-                  <c:v>20</c:v>
+                  <c:v>20.0</c:v>
                 </c:pt>
                 <c:pt idx="20">
-                  <c:v>21</c:v>
+                  <c:v>21.0</c:v>
                 </c:pt>
               </c:numCache>
             </c:numRef>
@@ -459,81 +473,92 @@
                 <c:formatCode>0.00</c:formatCode>
                 <c:ptCount val="21"/>
                 <c:pt idx="0">
-                  <c:v>37</c:v>
+                  <c:v>37.0</c:v>
                 </c:pt>
                 <c:pt idx="1">
-                  <c:v>36</c:v>
+                  <c:v>36.0</c:v>
                 </c:pt>
                 <c:pt idx="2">
-                  <c:v>35</c:v>
+                  <c:v>35.0</c:v>
                 </c:pt>
                 <c:pt idx="3">
-                  <c:v>33</c:v>
+                  <c:v>33.0</c:v>
                 </c:pt>
                 <c:pt idx="4">
-                  <c:v>38</c:v>
+                  <c:v>38.0</c:v>
                 </c:pt>
                 <c:pt idx="5">
-                  <c:v>33</c:v>
+                  <c:v>33.0</c:v>
                 </c:pt>
                 <c:pt idx="6">
-                  <c:v>29</c:v>
+                  <c:v>29.0</c:v>
                 </c:pt>
                 <c:pt idx="7">
-                  <c:v>27</c:v>
+                  <c:v>27.0</c:v>
                 </c:pt>
                 <c:pt idx="8">
-                  <c:v>27</c:v>
+                  <c:v>27.0</c:v>
                 </c:pt>
                 <c:pt idx="9">
-                  <c:v>25</c:v>
+                  <c:v>25.0</c:v>
                 </c:pt>
                 <c:pt idx="10">
-                  <c:v>23</c:v>
+                  <c:v>23.0</c:v>
                 </c:pt>
                 <c:pt idx="11">
-                  <c:v>21</c:v>
+                  <c:v>21.0</c:v>
                 </c:pt>
                 <c:pt idx="12">
-                  <c:v>17</c:v>
+                  <c:v>17.0</c:v>
                 </c:pt>
                 <c:pt idx="13">
-                  <c:v>15</c:v>
+                  <c:v>15.0</c:v>
                 </c:pt>
                 <c:pt idx="14">
-                  <c:v>12</c:v>
+                  <c:v>12.0</c:v>
                 </c:pt>
                 <c:pt idx="15">
-                  <c:v>10</c:v>
+                  <c:v>10.0</c:v>
                 </c:pt>
                 <c:pt idx="16">
-                  <c:v>7</c:v>
+                  <c:v>7.0</c:v>
                 </c:pt>
                 <c:pt idx="17">
-                  <c:v>4</c:v>
+                  <c:v>4.0</c:v>
                 </c:pt>
                 <c:pt idx="18">
-                  <c:v>1</c:v>
+                  <c:v>1.0</c:v>
                 </c:pt>
                 <c:pt idx="19">
-                  <c:v>0</c:v>
+                  <c:v>0.0</c:v>
                 </c:pt>
                 <c:pt idx="20">
-                  <c:v>0</c:v>
+                  <c:v>0.0</c:v>
                 </c:pt>
               </c:numCache>
             </c:numRef>
           </c:val>
+          <c:smooth val="0"/>
         </c:ser>
+        <c:dLbls>
+          <c:showLegendKey val="0"/>
+          <c:showVal val="0"/>
+          <c:showCatName val="0"/>
+          <c:showSerName val="0"/>
+          <c:showPercent val="0"/>
+          <c:showBubbleSize val="0"/>
+        </c:dLbls>
         <c:marker val="1"/>
-        <c:axId val="116890624"/>
-        <c:axId val="118081024"/>
+        <c:smooth val="0"/>
+        <c:axId val="-2087225096"/>
+        <c:axId val="-2108365944"/>
       </c:lineChart>
       <c:catAx>
-        <c:axId val="116890624"/>
+        <c:axId val="-2087225096"/>
         <c:scaling>
           <c:orientation val="minMax"/>
         </c:scaling>
+        <c:delete val="0"/>
         <c:axPos val="b"/>
         <c:title>
           <c:tx>
@@ -552,6 +577,7 @@
             </c:rich>
           </c:tx>
           <c:layout/>
+          <c:overlay val="0"/>
           <c:spPr>
             <a:noFill/>
             <a:ln w="25400">
@@ -560,6 +586,8 @@
           </c:spPr>
         </c:title>
         <c:numFmt formatCode="General" sourceLinked="1"/>
+        <c:majorTickMark val="out"/>
+        <c:minorTickMark val="none"/>
         <c:tickLblPos val="nextTo"/>
         <c:spPr>
           <a:ln w="3175">
@@ -579,16 +607,19 @@
             <a:endParaRPr lang="en-US"/>
           </a:p>
         </c:txPr>
-        <c:crossAx val="118081024"/>
+        <c:crossAx val="-2108365944"/>
         <c:crosses val="autoZero"/>
+        <c:auto val="0"/>
         <c:lblAlgn val="ctr"/>
         <c:lblOffset val="100"/>
+        <c:noMultiLvlLbl val="0"/>
       </c:catAx>
       <c:valAx>
-        <c:axId val="118081024"/>
+        <c:axId val="-2108365944"/>
         <c:scaling>
           <c:orientation val="minMax"/>
         </c:scaling>
+        <c:delete val="0"/>
         <c:axPos val="l"/>
         <c:majorGridlines>
           <c:spPr>
@@ -617,6 +648,7 @@
             </c:rich>
           </c:tx>
           <c:layout/>
+          <c:overlay val="0"/>
           <c:spPr>
             <a:noFill/>
             <a:ln w="25400">
@@ -625,6 +657,8 @@
           </c:spPr>
         </c:title>
         <c:numFmt formatCode="0.00" sourceLinked="1"/>
+        <c:majorTickMark val="out"/>
+        <c:minorTickMark val="none"/>
         <c:tickLblPos val="nextTo"/>
         <c:spPr>
           <a:ln w="9525">
@@ -641,7 +675,7 @@
             <a:endParaRPr lang="en-US"/>
           </a:p>
         </c:txPr>
-        <c:crossAx val="116890624"/>
+        <c:crossAx val="-2087225096"/>
         <c:crosses val="autoZero"/>
         <c:crossBetween val="between"/>
       </c:valAx>
@@ -660,12 +694,13 @@
         <c:manualLayout>
           <c:xMode val="edge"/>
           <c:yMode val="edge"/>
-          <c:x val="0.32274203640021698"/>
-          <c:y val="0.16282690960484819"/>
-          <c:w val="0.67480013709640119"/>
-          <c:h val="5.8526850766982677E-2"/>
+          <c:x val="0.322742036400217"/>
+          <c:y val="0.162826909604848"/>
+          <c:w val="0.674800137096401"/>
+          <c:h val="0.0585268507669827"/>
         </c:manualLayout>
       </c:layout>
+      <c:overlay val="0"/>
       <c:spPr>
         <a:noFill/>
         <a:ln w="25400">
@@ -673,7 +708,9 @@
         </a:ln>
       </c:spPr>
     </c:legend>
+    <c:plotVisOnly val="0"/>
     <c:dispBlanksAs val="gap"/>
+    <c:showDLblsOverMax val="0"/>
   </c:chart>
   <c:spPr>
     <a:solidFill>
@@ -686,13 +723,25 @@
       <a:prstDash val="solid"/>
     </a:ln>
   </c:spPr>
-  <c:externalData r:id="rId1"/>
+  <c:externalData r:id="rId1">
+    <c:autoUpdate val="0"/>
+  </c:externalData>
 </c:chartSpace>
 </file>
 
 <file path=ppt/charts/chart2.xml><?xml version="1.0" encoding="utf-8"?>
 <c:chartSpace xmlns:c="http://schemas.openxmlformats.org/drawingml/2006/chart" xmlns:a="http://schemas.openxmlformats.org/drawingml/2006/main" xmlns:r="http://schemas.openxmlformats.org/officeDocument/2006/relationships">
+  <c:date1904 val="0"/>
   <c:lang val="en-US"/>
+  <c:roundedCorners val="0"/>
+  <mc:AlternateContent xmlns:mc="http://schemas.openxmlformats.org/markup-compatibility/2006">
+    <mc:Choice xmlns:c14="http://schemas.microsoft.com/office/drawing/2007/8/2/chart" Requires="c14">
+      <c14:style val="102"/>
+    </mc:Choice>
+    <mc:Fallback>
+      <c:style val="2"/>
+    </mc:Fallback>
+  </mc:AlternateContent>
   <c:chart>
     <c:title>
       <c:tx>
@@ -711,6 +760,7 @@
         </c:rich>
       </c:tx>
       <c:layout/>
+      <c:overlay val="0"/>
       <c:spPr>
         <a:noFill/>
         <a:ln w="25400">
@@ -718,20 +768,22 @@
         </a:ln>
       </c:spPr>
     </c:title>
+    <c:autoTitleDeleted val="0"/>
     <c:plotArea>
       <c:layout>
         <c:manualLayout>
           <c:layoutTarget val="inner"/>
           <c:xMode val="edge"/>
           <c:yMode val="edge"/>
-          <c:x val="8.2706842827444768E-2"/>
-          <c:y val="0.17674418604651174"/>
-          <c:w val="0.89661736428843497"/>
-          <c:h val="0.59534883720930254"/>
+          <c:x val="0.0827068428274448"/>
+          <c:y val="0.176744186046512"/>
+          <c:w val="0.896617364288435"/>
+          <c:h val="0.595348837209303"/>
         </c:manualLayout>
       </c:layout>
       <c:lineChart>
         <c:grouping val="standard"/>
+        <c:varyColors val="0"/>
         <c:ser>
           <c:idx val="0"/>
           <c:order val="0"/>
@@ -776,46 +828,46 @@
                 <c:formatCode>General</c:formatCode>
                 <c:ptCount val="14"/>
                 <c:pt idx="0">
-                  <c:v>1</c:v>
+                  <c:v>1.0</c:v>
                 </c:pt>
                 <c:pt idx="1">
-                  <c:v>2</c:v>
+                  <c:v>2.0</c:v>
                 </c:pt>
                 <c:pt idx="2">
-                  <c:v>3</c:v>
+                  <c:v>3.0</c:v>
                 </c:pt>
                 <c:pt idx="3">
-                  <c:v>4</c:v>
+                  <c:v>4.0</c:v>
                 </c:pt>
                 <c:pt idx="4">
-                  <c:v>5</c:v>
+                  <c:v>5.0</c:v>
                 </c:pt>
                 <c:pt idx="5">
-                  <c:v>6</c:v>
+                  <c:v>6.0</c:v>
                 </c:pt>
                 <c:pt idx="6">
-                  <c:v>7</c:v>
+                  <c:v>7.0</c:v>
                 </c:pt>
                 <c:pt idx="7">
-                  <c:v>8</c:v>
+                  <c:v>8.0</c:v>
                 </c:pt>
                 <c:pt idx="8">
-                  <c:v>9</c:v>
+                  <c:v>9.0</c:v>
                 </c:pt>
                 <c:pt idx="9">
-                  <c:v>10</c:v>
+                  <c:v>10.0</c:v>
                 </c:pt>
                 <c:pt idx="10">
-                  <c:v>11</c:v>
+                  <c:v>11.0</c:v>
                 </c:pt>
                 <c:pt idx="11">
-                  <c:v>12</c:v>
+                  <c:v>12.0</c:v>
                 </c:pt>
                 <c:pt idx="12">
-                  <c:v>13</c:v>
+                  <c:v>13.0</c:v>
                 </c:pt>
                 <c:pt idx="13">
-                  <c:v>14</c:v>
+                  <c:v>14.0</c:v>
                 </c:pt>
               </c:numCache>
             </c:numRef>
@@ -827,50 +879,51 @@
                 <c:formatCode>General</c:formatCode>
                 <c:ptCount val="14"/>
                 <c:pt idx="0">
-                  <c:v>39</c:v>
+                  <c:v>39.0</c:v>
                 </c:pt>
                 <c:pt idx="1">
-                  <c:v>36.214285714285715</c:v>
+                  <c:v>36.21428571428572</c:v>
                 </c:pt>
                 <c:pt idx="2">
-                  <c:v>33.428571428571431</c:v>
+                  <c:v>33.42857142857143</c:v>
                 </c:pt>
                 <c:pt idx="3">
-                  <c:v>30.642857142857142</c:v>
+                  <c:v>30.64285714285715</c:v>
                 </c:pt>
                 <c:pt idx="4">
-                  <c:v>27.857142857142858</c:v>
+                  <c:v>27.85714285714285</c:v>
                 </c:pt>
                 <c:pt idx="5">
-                  <c:v>25.071428571428573</c:v>
+                  <c:v>25.07142857142857</c:v>
                 </c:pt>
                 <c:pt idx="6">
-                  <c:v>22.285714285714285</c:v>
+                  <c:v>22.28571428571428</c:v>
                 </c:pt>
                 <c:pt idx="7">
                   <c:v>19.5</c:v>
                 </c:pt>
                 <c:pt idx="8">
-                  <c:v>16.714285714285715</c:v>
+                  <c:v>16.71428571428572</c:v>
                 </c:pt>
                 <c:pt idx="9">
-                  <c:v>13.928571428571431</c:v>
+                  <c:v>13.92857142857143</c:v>
                 </c:pt>
                 <c:pt idx="10">
-                  <c:v>11.142857142857146</c:v>
+                  <c:v>11.14285714285714</c:v>
                 </c:pt>
                 <c:pt idx="11">
-                  <c:v>8.3571428571428577</c:v>
+                  <c:v>8.35714285714286</c:v>
                 </c:pt>
                 <c:pt idx="12">
-                  <c:v>5.5714285714285694</c:v>
+                  <c:v>5.57142857142857</c:v>
                 </c:pt>
                 <c:pt idx="13">
-                  <c:v>2.7857142857142847</c:v>
+                  <c:v>2.785714285714285</c:v>
                 </c:pt>
               </c:numCache>
             </c:numRef>
           </c:val>
+          <c:smooth val="0"/>
         </c:ser>
         <c:ser>
           <c:idx val="1"/>
@@ -916,46 +969,46 @@
                 <c:formatCode>General</c:formatCode>
                 <c:ptCount val="14"/>
                 <c:pt idx="0">
-                  <c:v>1</c:v>
+                  <c:v>1.0</c:v>
                 </c:pt>
                 <c:pt idx="1">
-                  <c:v>2</c:v>
+                  <c:v>2.0</c:v>
                 </c:pt>
                 <c:pt idx="2">
-                  <c:v>3</c:v>
+                  <c:v>3.0</c:v>
                 </c:pt>
                 <c:pt idx="3">
-                  <c:v>4</c:v>
+                  <c:v>4.0</c:v>
                 </c:pt>
                 <c:pt idx="4">
-                  <c:v>5</c:v>
+                  <c:v>5.0</c:v>
                 </c:pt>
                 <c:pt idx="5">
-                  <c:v>6</c:v>
+                  <c:v>6.0</c:v>
                 </c:pt>
                 <c:pt idx="6">
-                  <c:v>7</c:v>
+                  <c:v>7.0</c:v>
                 </c:pt>
                 <c:pt idx="7">
-                  <c:v>8</c:v>
+                  <c:v>8.0</c:v>
                 </c:pt>
                 <c:pt idx="8">
-                  <c:v>9</c:v>
+                  <c:v>9.0</c:v>
                 </c:pt>
                 <c:pt idx="9">
-                  <c:v>10</c:v>
+                  <c:v>10.0</c:v>
                 </c:pt>
                 <c:pt idx="10">
-                  <c:v>11</c:v>
+                  <c:v>11.0</c:v>
                 </c:pt>
                 <c:pt idx="11">
-                  <c:v>12</c:v>
+                  <c:v>12.0</c:v>
                 </c:pt>
                 <c:pt idx="12">
-                  <c:v>13</c:v>
+                  <c:v>13.0</c:v>
                 </c:pt>
                 <c:pt idx="13">
-                  <c:v>14</c:v>
+                  <c:v>14.0</c:v>
                 </c:pt>
               </c:numCache>
             </c:numRef>
@@ -967,13 +1020,13 @@
                 <c:formatCode>General</c:formatCode>
                 <c:ptCount val="14"/>
                 <c:pt idx="0">
-                  <c:v>39</c:v>
+                  <c:v>39.0</c:v>
                 </c:pt>
                 <c:pt idx="1">
-                  <c:v>37</c:v>
+                  <c:v>37.0</c:v>
                 </c:pt>
                 <c:pt idx="2">
-                  <c:v>33</c:v>
+                  <c:v>33.0</c:v>
                 </c:pt>
                 <c:pt idx="3">
                   <c:v>31.5</c:v>
@@ -982,13 +1035,13 @@
                   <c:v>29.5</c:v>
                 </c:pt>
                 <c:pt idx="5">
-                  <c:v>27</c:v>
+                  <c:v>27.0</c:v>
                 </c:pt>
                 <c:pt idx="6">
-                  <c:v>23</c:v>
+                  <c:v>23.0</c:v>
                 </c:pt>
                 <c:pt idx="7">
-                  <c:v>19</c:v>
+                  <c:v>19.0</c:v>
                 </c:pt>
                 <c:pt idx="8">
                   <c:v>19.5</c:v>
@@ -1000,27 +1053,38 @@
                   <c:v>10.5</c:v>
                 </c:pt>
                 <c:pt idx="11">
-                  <c:v>8</c:v>
+                  <c:v>8.0</c:v>
                 </c:pt>
                 <c:pt idx="12">
-                  <c:v>2</c:v>
+                  <c:v>2.0</c:v>
                 </c:pt>
                 <c:pt idx="13">
-                  <c:v>0</c:v>
+                  <c:v>0.0</c:v>
                 </c:pt>
               </c:numCache>
             </c:numRef>
           </c:val>
+          <c:smooth val="0"/>
         </c:ser>
+        <c:dLbls>
+          <c:showLegendKey val="0"/>
+          <c:showVal val="0"/>
+          <c:showCatName val="0"/>
+          <c:showSerName val="0"/>
+          <c:showPercent val="0"/>
+          <c:showBubbleSize val="0"/>
+        </c:dLbls>
         <c:marker val="1"/>
-        <c:axId val="122593664"/>
-        <c:axId val="122596352"/>
+        <c:smooth val="0"/>
+        <c:axId val="-2112691880"/>
+        <c:axId val="-2112448024"/>
       </c:lineChart>
       <c:catAx>
-        <c:axId val="122593664"/>
+        <c:axId val="-2112691880"/>
         <c:scaling>
           <c:orientation val="minMax"/>
         </c:scaling>
+        <c:delete val="0"/>
         <c:axPos val="b"/>
         <c:title>
           <c:tx>
@@ -1039,6 +1103,7 @@
             </c:rich>
           </c:tx>
           <c:layout/>
+          <c:overlay val="0"/>
           <c:spPr>
             <a:noFill/>
             <a:ln w="25400">
@@ -1047,6 +1112,8 @@
           </c:spPr>
         </c:title>
         <c:numFmt formatCode="General" sourceLinked="1"/>
+        <c:majorTickMark val="out"/>
+        <c:minorTickMark val="none"/>
         <c:tickLblPos val="nextTo"/>
         <c:spPr>
           <a:ln w="3175">
@@ -1066,16 +1133,19 @@
             <a:endParaRPr lang="en-US"/>
           </a:p>
         </c:txPr>
-        <c:crossAx val="122596352"/>
+        <c:crossAx val="-2112448024"/>
         <c:crosses val="autoZero"/>
+        <c:auto val="0"/>
         <c:lblAlgn val="ctr"/>
         <c:lblOffset val="100"/>
+        <c:noMultiLvlLbl val="0"/>
       </c:catAx>
       <c:valAx>
-        <c:axId val="122596352"/>
+        <c:axId val="-2112448024"/>
         <c:scaling>
           <c:orientation val="minMax"/>
         </c:scaling>
+        <c:delete val="0"/>
         <c:axPos val="l"/>
         <c:majorGridlines>
           <c:spPr>
@@ -1104,6 +1174,7 @@
             </c:rich>
           </c:tx>
           <c:layout/>
+          <c:overlay val="0"/>
           <c:spPr>
             <a:noFill/>
             <a:ln w="25400">
@@ -1112,6 +1183,8 @@
           </c:spPr>
         </c:title>
         <c:numFmt formatCode="General" sourceLinked="1"/>
+        <c:majorTickMark val="out"/>
+        <c:minorTickMark val="none"/>
         <c:tickLblPos val="nextTo"/>
         <c:spPr>
           <a:ln w="9525">
@@ -1128,7 +1201,7 @@
             <a:endParaRPr lang="en-US"/>
           </a:p>
         </c:txPr>
-        <c:crossAx val="122593664"/>
+        <c:crossAx val="-2112691880"/>
         <c:crosses val="autoZero"/>
         <c:crossBetween val="between"/>
       </c:valAx>
@@ -1147,14 +1220,17 @@
         <c:manualLayout>
           <c:xMode val="edge"/>
           <c:yMode val="edge"/>
-          <c:x val="0.2936936936936938"/>
-          <c:y val="0.18035428177637527"/>
-          <c:w val="0.6705068989528169"/>
-          <c:h val="5.2135193525473911E-2"/>
+          <c:x val="0.293693693693694"/>
+          <c:y val="0.180354281776375"/>
+          <c:w val="0.670506898952817"/>
+          <c:h val="0.0521351935254739"/>
         </c:manualLayout>
       </c:layout>
+      <c:overlay val="0"/>
     </c:legend>
+    <c:plotVisOnly val="0"/>
     <c:dispBlanksAs val="gap"/>
+    <c:showDLblsOverMax val="0"/>
   </c:chart>
   <c:spPr>
     <a:solidFill>
@@ -1167,7 +1243,9 @@
       <a:prstDash val="solid"/>
     </a:ln>
   </c:spPr>
-  <c:externalData r:id="rId1"/>
+  <c:externalData r:id="rId1">
+    <c:autoUpdate val="0"/>
+  </c:externalData>
 </c:chartSpace>
 </file>
 
@@ -1254,7 +1332,7 @@
             <a:fld id="{12CDBA90-CDB2-9846-BC3C-C942DFE4778C}" type="datetimeFigureOut">
               <a:rPr lang="en-US" smtClean="0"/>
               <a:pPr/>
-              <a:t>11/25/2012</a:t>
+              <a:t>11/25/12</a:t>
             </a:fld>
             <a:endParaRPr lang="en-US" dirty="0"/>
           </a:p>
@@ -1423,7 +1501,7 @@
     </p:spTree>
     <p:extLst>
       <p:ext uri="{BB962C8B-B14F-4D97-AF65-F5344CB8AC3E}">
-        <p14:creationId xmlns="" xmlns:p14="http://schemas.microsoft.com/office/powerpoint/2010/main" val="2212999972"/>
+        <p14:creationId xmlns:p14="http://schemas.microsoft.com/office/powerpoint/2010/main" val="2212999972"/>
       </p:ext>
     </p:extLst>
   </p:cSld>
@@ -1712,7 +1790,7 @@
     </p:spTree>
     <p:extLst>
       <p:ext uri="{BB962C8B-B14F-4D97-AF65-F5344CB8AC3E}">
-        <p14:creationId xmlns="" xmlns:p14="http://schemas.microsoft.com/office/powerpoint/2010/main" val="385254405"/>
+        <p14:creationId xmlns:p14="http://schemas.microsoft.com/office/powerpoint/2010/main" val="385254405"/>
       </p:ext>
     </p:extLst>
   </p:cSld>
@@ -2652,7 +2730,7 @@
             <a:fld id="{B1A24CD3-204F-4468-8EE4-28A6668D006A}" type="datetimeFigureOut">
               <a:rPr lang="en-US" smtClean="0"/>
               <a:pPr/>
-              <a:t>11/25/2012</a:t>
+              <a:t>11/25/12</a:t>
             </a:fld>
             <a:endParaRPr lang="en-US" dirty="0"/>
           </a:p>
@@ -2940,7 +3018,7 @@
             <a:fld id="{B1A24CD3-204F-4468-8EE4-28A6668D006A}" type="datetimeFigureOut">
               <a:rPr lang="en-US" smtClean="0"/>
               <a:pPr/>
-              <a:t>11/25/2012</a:t>
+              <a:t>11/25/12</a:t>
             </a:fld>
             <a:endParaRPr lang="en-US" dirty="0"/>
           </a:p>
@@ -3364,7 +3442,7 @@
             <a:fld id="{B1A24CD3-204F-4468-8EE4-28A6668D006A}" type="datetimeFigureOut">
               <a:rPr lang="en-US" smtClean="0"/>
               <a:pPr/>
-              <a:t>11/25/2012</a:t>
+              <a:t>11/25/12</a:t>
             </a:fld>
             <a:endParaRPr lang="en-US" dirty="0"/>
           </a:p>
@@ -3783,7 +3861,7 @@
             <a:fld id="{B1A24CD3-204F-4468-8EE4-28A6668D006A}" type="datetimeFigureOut">
               <a:rPr lang="en-US" smtClean="0"/>
               <a:pPr/>
-              <a:t>11/25/2012</a:t>
+              <a:t>11/25/12</a:t>
             </a:fld>
             <a:endParaRPr lang="en-US" dirty="0"/>
           </a:p>
@@ -3918,7 +3996,7 @@
             <a:fld id="{B1A24CD3-204F-4468-8EE4-28A6668D006A}" type="datetimeFigureOut">
               <a:rPr lang="en-US" smtClean="0"/>
               <a:pPr/>
-              <a:t>11/25/2012</a:t>
+              <a:t>11/25/12</a:t>
             </a:fld>
             <a:endParaRPr lang="en-US" dirty="0"/>
           </a:p>
@@ -4242,7 +4320,7 @@
             <a:fld id="{B1A24CD3-204F-4468-8EE4-28A6668D006A}" type="datetimeFigureOut">
               <a:rPr lang="en-US" smtClean="0"/>
               <a:pPr/>
-              <a:t>11/25/2012</a:t>
+              <a:t>11/25/12</a:t>
             </a:fld>
             <a:endParaRPr lang="en-US" dirty="0"/>
           </a:p>
@@ -4488,7 +4566,7 @@
             <a:fld id="{B1A24CD3-204F-4468-8EE4-28A6668D006A}" type="datetimeFigureOut">
               <a:rPr lang="en-US" smtClean="0"/>
               <a:pPr/>
-              <a:t>11/25/2012</a:t>
+              <a:t>11/25/12</a:t>
             </a:fld>
             <a:endParaRPr lang="en-US" dirty="0"/>
           </a:p>
@@ -4828,7 +4906,7 @@
             <a:fld id="{B1A24CD3-204F-4468-8EE4-28A6668D006A}" type="datetimeFigureOut">
               <a:rPr lang="en-US" smtClean="0"/>
               <a:pPr/>
-              <a:t>11/25/2012</a:t>
+              <a:t>11/25/12</a:t>
             </a:fld>
             <a:endParaRPr lang="en-US" dirty="0"/>
           </a:p>
@@ -5130,7 +5208,7 @@
             <a:fld id="{B1A24CD3-204F-4468-8EE4-28A6668D006A}" type="datetimeFigureOut">
               <a:rPr lang="en-US" smtClean="0"/>
               <a:pPr/>
-              <a:t>11/25/2012</a:t>
+              <a:t>11/25/12</a:t>
             </a:fld>
             <a:endParaRPr lang="en-US" dirty="0"/>
           </a:p>
@@ -5539,7 +5617,7 @@
             <a:fld id="{B1A24CD3-204F-4468-8EE4-28A6668D006A}" type="datetimeFigureOut">
               <a:rPr lang="en-US" smtClean="0"/>
               <a:pPr/>
-              <a:t>11/25/2012</a:t>
+              <a:t>11/25/12</a:t>
             </a:fld>
             <a:endParaRPr lang="en-US" dirty="0"/>
           </a:p>
@@ -5763,7 +5841,7 @@
             <a:fld id="{B1A24CD3-204F-4468-8EE4-28A6668D006A}" type="datetimeFigureOut">
               <a:rPr lang="en-US" smtClean="0"/>
               <a:pPr/>
-              <a:t>11/25/2012</a:t>
+              <a:t>11/25/12</a:t>
             </a:fld>
             <a:endParaRPr lang="en-US" dirty="0"/>
           </a:p>
@@ -5982,7 +6060,7 @@
             <a:fld id="{B1A24CD3-204F-4468-8EE4-28A6668D006A}" type="datetimeFigureOut">
               <a:rPr lang="en-US" smtClean="0"/>
               <a:pPr/>
-              <a:t>11/25/2012</a:t>
+              <a:t>11/25/12</a:t>
             </a:fld>
             <a:endParaRPr lang="en-US" dirty="0"/>
           </a:p>
@@ -6289,7 +6367,7 @@
             <a:fld id="{B1A24CD3-204F-4468-8EE4-28A6668D006A}" type="datetimeFigureOut">
               <a:rPr lang="en-US" smtClean="0"/>
               <a:pPr/>
-              <a:t>11/25/2012</a:t>
+              <a:t>11/25/12</a:t>
             </a:fld>
             <a:endParaRPr lang="en-US" dirty="0"/>
           </a:p>
@@ -6618,7 +6696,7 @@
             <a:fld id="{B1A24CD3-204F-4468-8EE4-28A6668D006A}" type="datetimeFigureOut">
               <a:rPr lang="en-US" smtClean="0"/>
               <a:pPr/>
-              <a:t>11/25/2012</a:t>
+              <a:t>11/25/12</a:t>
             </a:fld>
             <a:endParaRPr lang="en-US" dirty="0"/>
           </a:p>
@@ -6955,7 +7033,7 @@
             <a:fld id="{B1A24CD3-204F-4468-8EE4-28A6668D006A}" type="datetimeFigureOut">
               <a:rPr lang="en-US" smtClean="0"/>
               <a:pPr/>
-              <a:t>11/25/2012</a:t>
+              <a:t>11/25/12</a:t>
             </a:fld>
             <a:endParaRPr lang="en-US" dirty="0"/>
           </a:p>
@@ -7581,7 +7659,7 @@
             <a:fld id="{B1A24CD3-204F-4468-8EE4-28A6668D006A}" type="datetimeFigureOut">
               <a:rPr lang="en-US" smtClean="0"/>
               <a:pPr/>
-              <a:t>11/25/2012</a:t>
+              <a:t>11/25/12</a:t>
             </a:fld>
             <a:endParaRPr lang="en-US" dirty="0"/>
           </a:p>
@@ -8070,7 +8148,7 @@
             <a:fld id="{B1A24CD3-204F-4468-8EE4-28A6668D006A}" type="datetimeFigureOut">
               <a:rPr lang="en-US" smtClean="0"/>
               <a:pPr/>
-              <a:t>11/25/2012</a:t>
+              <a:t>11/25/12</a:t>
             </a:fld>
             <a:endParaRPr lang="en-US" dirty="0"/>
           </a:p>
@@ -8320,7 +8398,7 @@
             <a:fld id="{B1A24CD3-204F-4468-8EE4-28A6668D006A}" type="datetimeFigureOut">
               <a:rPr lang="en-US" smtClean="0"/>
               <a:pPr/>
-              <a:t>11/25/2012</a:t>
+              <a:t>11/25/12</a:t>
             </a:fld>
             <a:endParaRPr lang="en-US" dirty="0"/>
           </a:p>
@@ -8618,7 +8696,7 @@
             <a:fld id="{B1A24CD3-204F-4468-8EE4-28A6668D006A}" type="datetimeFigureOut">
               <a:rPr lang="en-US" smtClean="0"/>
               <a:pPr/>
-              <a:t>11/25/2012</a:t>
+              <a:t>11/25/12</a:t>
             </a:fld>
             <a:endParaRPr lang="en-US" dirty="0"/>
           </a:p>
@@ -9132,7 +9210,7 @@
     </p:spTree>
     <p:extLst>
       <p:ext uri="{BB962C8B-B14F-4D97-AF65-F5344CB8AC3E}">
-        <p14:creationId xmlns="" xmlns:p14="http://schemas.microsoft.com/office/powerpoint/2010/main" val="3291486969"/>
+        <p14:creationId xmlns:p14="http://schemas.microsoft.com/office/powerpoint/2010/main" val="3291486969"/>
       </p:ext>
     </p:extLst>
   </p:cSld>
@@ -9142,7 +9220,7 @@
   <p:timing>
     <p:tnLst>
       <p:par>
-        <p:cTn id="1" dur="indefinite" restart="never" nodeType="tmRoot"/>
+        <p:cTn xmlns:p14="http://schemas.microsoft.com/office/powerpoint/2010/main" id="1" dur="indefinite" restart="never" nodeType="tmRoot"/>
       </p:par>
     </p:tnLst>
   </p:timing>
@@ -9328,7 +9406,7 @@
     </p:spTree>
     <p:extLst>
       <p:ext uri="{BB962C8B-B14F-4D97-AF65-F5344CB8AC3E}">
-        <p14:creationId xmlns="" xmlns:p14="http://schemas.microsoft.com/office/powerpoint/2010/main" val="3853707377"/>
+        <p14:creationId xmlns:p14="http://schemas.microsoft.com/office/powerpoint/2010/main" val="3853707377"/>
       </p:ext>
     </p:extLst>
   </p:cSld>
@@ -9338,7 +9416,7 @@
   <p:timing>
     <p:tnLst>
       <p:par>
-        <p:cTn id="1" dur="indefinite" restart="never" nodeType="tmRoot"/>
+        <p:cTn xmlns:p14="http://schemas.microsoft.com/office/powerpoint/2010/main" id="1" dur="indefinite" restart="never" nodeType="tmRoot"/>
       </p:par>
     </p:tnLst>
   </p:timing>
@@ -9470,7 +9548,7 @@
     </p:spTree>
     <p:extLst>
       <p:ext uri="{BB962C8B-B14F-4D97-AF65-F5344CB8AC3E}">
-        <p14:creationId xmlns="" xmlns:p14="http://schemas.microsoft.com/office/powerpoint/2010/main" val="1633817389"/>
+        <p14:creationId xmlns:p14="http://schemas.microsoft.com/office/powerpoint/2010/main" val="1633817389"/>
       </p:ext>
     </p:extLst>
   </p:cSld>
@@ -9480,7 +9558,7 @@
   <p:timing>
     <p:tnLst>
       <p:par>
-        <p:cTn id="1" dur="indefinite" restart="never" nodeType="tmRoot"/>
+        <p:cTn xmlns:p14="http://schemas.microsoft.com/office/powerpoint/2010/main" id="1" dur="indefinite" restart="never" nodeType="tmRoot"/>
       </p:par>
     </p:tnLst>
   </p:timing>
@@ -9568,7 +9646,7 @@
         <p:spPr>
           <a:xfrm>
             <a:off x="255720" y="338668"/>
-            <a:ext cx="7012900" cy="2172057"/>
+            <a:ext cx="7179785" cy="2172057"/>
           </a:xfrm>
         </p:spPr>
         <p:txBody>
@@ -9578,32 +9656,45 @@
           <a:lstStyle/>
           <a:p>
             <a:r>
-              <a:rPr lang="en-US" sz="1700" dirty="0" smtClean="0"/>
-              <a:t>Re-conceptualization of the ‘classic’ course </a:t>
-            </a:r>
-            <a:r>
-              <a:rPr lang="en-US" sz="1700" dirty="0" smtClean="0"/>
-              <a:t>planning system</a:t>
+              <a:rPr lang="en-US" sz="1700" b="1" dirty="0">
+                <a:solidFill>
+                  <a:schemeClr val="accent1"/>
+                </a:solidFill>
+              </a:rPr>
+              <a:t>Concept</a:t>
+            </a:r>
+          </a:p>
+          <a:p>
+            <a:pPr marL="685800" lvl="1">
+              <a:buClr>
+                <a:schemeClr val="accent1"/>
+              </a:buClr>
+            </a:pPr>
+            <a:r>
+              <a:rPr lang="en-US" sz="1700" dirty="0"/>
+              <a:t>Re-conceptualization of the ‘classic’ course planning system</a:t>
             </a:r>
             <a:endParaRPr lang="en-US" sz="1700" dirty="0"/>
           </a:p>
           <a:p>
-            <a:r>
-              <a:rPr lang="en-US" sz="1700" dirty="0" smtClean="0"/>
-              <a:t>One-stop course planning system for ambitious and </a:t>
-            </a:r>
-            <a:r>
-              <a:rPr lang="en-US" sz="1700" dirty="0" smtClean="0"/>
-              <a:t>strategically </a:t>
-            </a:r>
-            <a:r>
-              <a:rPr lang="en-US" sz="1700" dirty="0" smtClean="0"/>
-              <a:t>focused student</a:t>
-            </a:r>
-          </a:p>
-          <a:p>
-            <a:r>
-              <a:rPr lang="en-US" sz="1700" dirty="0" smtClean="0"/>
+            <a:pPr marL="685800" lvl="1">
+              <a:buClr>
+                <a:schemeClr val="accent1"/>
+              </a:buClr>
+            </a:pPr>
+            <a:r>
+              <a:rPr lang="en-US" sz="1700" dirty="0"/>
+              <a:t>One-stop course planning system for ambitious and strategically focused student</a:t>
+            </a:r>
+          </a:p>
+          <a:p>
+            <a:pPr marL="685800" lvl="1">
+              <a:buClr>
+                <a:schemeClr val="accent1"/>
+              </a:buClr>
+            </a:pPr>
+            <a:r>
+              <a:rPr lang="en-US" sz="1700" dirty="0"/>
               <a:t>Aimed to help SCU students balance all their responsibilities through planning tools</a:t>
             </a:r>
           </a:p>
@@ -9639,7 +9730,7 @@
           <a:blip r:embed="rId3" cstate="print">
             <a:extLst>
               <a:ext uri="{28A0092B-C50C-407E-A947-70E740481C1C}">
-                <a14:useLocalDpi xmlns="" xmlns:a14="http://schemas.microsoft.com/office/drawing/2010/main" val="0"/>
+                <a14:useLocalDpi xmlns:a14="http://schemas.microsoft.com/office/drawing/2010/main" val="0"/>
               </a:ext>
             </a:extLst>
           </a:blip>
@@ -9648,8 +9739,8 @@
         </p:blipFill>
         <p:spPr>
           <a:xfrm>
-            <a:off x="767159" y="2231756"/>
-            <a:ext cx="6083091" cy="1962908"/>
+            <a:off x="767159" y="2510724"/>
+            <a:ext cx="6083091" cy="1683939"/>
           </a:xfrm>
           <a:prstGeom prst="rect">
             <a:avLst/>
@@ -9931,7 +10022,7 @@
     </p:spTree>
     <p:extLst>
       <p:ext uri="{BB962C8B-B14F-4D97-AF65-F5344CB8AC3E}">
-        <p14:creationId xmlns="" xmlns:p14="http://schemas.microsoft.com/office/powerpoint/2010/main" val="1668180396"/>
+        <p14:creationId xmlns:p14="http://schemas.microsoft.com/office/powerpoint/2010/main" val="1668180396"/>
       </p:ext>
     </p:extLst>
   </p:cSld>
@@ -9941,7 +10032,7 @@
   <p:timing>
     <p:tnLst>
       <p:par>
-        <p:cTn id="1" dur="indefinite" restart="never" nodeType="tmRoot"/>
+        <p:cTn xmlns:p14="http://schemas.microsoft.com/office/powerpoint/2010/main" id="1" dur="indefinite" restart="never" nodeType="tmRoot"/>
       </p:par>
     </p:tnLst>
   </p:timing>
@@ -9994,7 +10085,7 @@
     </p:spTree>
     <p:extLst>
       <p:ext uri="{BB962C8B-B14F-4D97-AF65-F5344CB8AC3E}">
-        <p14:creationId xmlns="" xmlns:p14="http://schemas.microsoft.com/office/powerpoint/2010/main" val="928388685"/>
+        <p14:creationId xmlns:p14="http://schemas.microsoft.com/office/powerpoint/2010/main" val="928388685"/>
       </p:ext>
     </p:extLst>
   </p:cSld>
@@ -10004,7 +10095,7 @@
   <p:timing>
     <p:tnLst>
       <p:par>
-        <p:cTn id="1" dur="indefinite" restart="never" nodeType="tmRoot"/>
+        <p:cTn xmlns:p14="http://schemas.microsoft.com/office/powerpoint/2010/main" id="1" dur="indefinite" restart="never" nodeType="tmRoot"/>
       </p:par>
     </p:tnLst>
   </p:timing>
@@ -10089,14 +10180,14 @@
             <p:ph idx="1"/>
             <p:extLst>
               <p:ext uri="{D42A27DB-BD31-4B8C-83A1-F6EECF244321}">
-                <p14:modId xmlns="" xmlns:p14="http://schemas.microsoft.com/office/powerpoint/2010/main" val="3988399231"/>
+                <p14:modId xmlns:p14="http://schemas.microsoft.com/office/powerpoint/2010/main" val="3988399231"/>
               </p:ext>
             </p:extLst>
           </p:nvPr>
         </p:nvGraphicFramePr>
         <p:xfrm>
           <a:off x="244243" y="213699"/>
-          <a:ext cx="6874902" cy="6454500"/>
+          <a:ext cx="6874902" cy="6473232"/>
         </p:xfrm>
         <a:graphic>
           <a:graphicData uri="http://schemas.openxmlformats.org/drawingml/2006/table">
@@ -11255,7 +11346,7 @@
     </p:spTree>
     <p:extLst>
       <p:ext uri="{BB962C8B-B14F-4D97-AF65-F5344CB8AC3E}">
-        <p14:creationId xmlns="" xmlns:p14="http://schemas.microsoft.com/office/powerpoint/2010/main" val="1530510290"/>
+        <p14:creationId xmlns:p14="http://schemas.microsoft.com/office/powerpoint/2010/main" val="1530510290"/>
       </p:ext>
     </p:extLst>
   </p:cSld>
@@ -11265,7 +11356,7 @@
   <p:timing>
     <p:tnLst>
       <p:par>
-        <p:cTn id="1" dur="indefinite" restart="never" nodeType="tmRoot"/>
+        <p:cTn xmlns:p14="http://schemas.microsoft.com/office/powerpoint/2010/main" id="1" dur="indefinite" restart="never" nodeType="tmRoot"/>
       </p:par>
     </p:tnLst>
   </p:timing>
@@ -11354,7 +11445,7 @@
     </p:spTree>
     <p:extLst>
       <p:ext uri="{BB962C8B-B14F-4D97-AF65-F5344CB8AC3E}">
-        <p14:creationId xmlns="" xmlns:p14="http://schemas.microsoft.com/office/powerpoint/2010/main" val="1138632541"/>
+        <p14:creationId xmlns:p14="http://schemas.microsoft.com/office/powerpoint/2010/main" val="1138632541"/>
       </p:ext>
     </p:extLst>
   </p:cSld>
@@ -11364,7 +11455,7 @@
   <p:timing>
     <p:tnLst>
       <p:par>
-        <p:cTn id="1" dur="indefinite" restart="never" nodeType="tmRoot"/>
+        <p:cTn xmlns:p14="http://schemas.microsoft.com/office/powerpoint/2010/main" id="1" dur="indefinite" restart="never" nodeType="tmRoot"/>
       </p:par>
     </p:tnLst>
   </p:timing>
@@ -11613,7 +11704,7 @@
             <p:ph idx="1"/>
             <p:extLst>
               <p:ext uri="{D42A27DB-BD31-4B8C-83A1-F6EECF244321}">
-                <p14:modId xmlns="" xmlns:p14="http://schemas.microsoft.com/office/powerpoint/2010/main" val="2952445889"/>
+                <p14:modId xmlns:p14="http://schemas.microsoft.com/office/powerpoint/2010/main" val="2263006737"/>
               </p:ext>
             </p:extLst>
           </p:nvPr>
@@ -12251,6 +12342,18 @@
                         </a:spcAft>
                       </a:pPr>
                       <a:r>
+                        <a:rPr lang="en-US" sz="1600" dirty="0" err="1" smtClean="0">
+                          <a:solidFill>
+                            <a:srgbClr val="000000"/>
+                          </a:solidFill>
+                          <a:effectLst/>
+                          <a:latin typeface="+mn-lt"/>
+                          <a:ea typeface="Arial"/>
+                          <a:cs typeface="Arial"/>
+                        </a:rPr>
+                        <a:t>Poornima</a:t>
+                      </a:r>
+                      <a:r>
                         <a:rPr lang="en-US" sz="1600" dirty="0" smtClean="0">
                           <a:solidFill>
                             <a:srgbClr val="000000"/>
@@ -12260,7 +12363,7 @@
                           <a:ea typeface="Arial"/>
                           <a:cs typeface="Arial"/>
                         </a:rPr>
-                        <a:t>Shradha</a:t>
+                        <a:t>, Shradha</a:t>
                       </a:r>
                       <a:endParaRPr lang="en-US" sz="1600" dirty="0">
                         <a:solidFill>
@@ -13006,7 +13109,7 @@
     </p:spTree>
     <p:extLst>
       <p:ext uri="{BB962C8B-B14F-4D97-AF65-F5344CB8AC3E}">
-        <p14:creationId xmlns="" xmlns:p14="http://schemas.microsoft.com/office/powerpoint/2010/main" val="1418101890"/>
+        <p14:creationId xmlns:p14="http://schemas.microsoft.com/office/powerpoint/2010/main" val="1418101890"/>
       </p:ext>
     </p:extLst>
   </p:cSld>
@@ -13016,7 +13119,7 @@
   <p:timing>
     <p:tnLst>
       <p:par>
-        <p:cTn id="1" dur="indefinite" restart="never" nodeType="tmRoot"/>
+        <p:cTn xmlns:p14="http://schemas.microsoft.com/office/powerpoint/2010/main" id="1" dur="indefinite" restart="never" nodeType="tmRoot"/>
       </p:par>
     </p:tnLst>
   </p:timing>
@@ -13068,14 +13171,6 @@
               </a:rPr>
               <a:t>Current </a:t>
             </a:r>
-            <a:r>
-              <a:rPr lang="en-US" sz="2400" dirty="0" smtClean="0">
-                <a:solidFill>
-                  <a:srgbClr val="FFFFFF"/>
-                </a:solidFill>
-              </a:rPr>
-              <a:t/>
-            </a:r>
             <a:br>
               <a:rPr lang="en-US" sz="2400" dirty="0" smtClean="0">
                 <a:solidFill>
@@ -13124,14 +13219,14 @@
             <p:ph idx="1"/>
             <p:extLst>
               <p:ext uri="{D42A27DB-BD31-4B8C-83A1-F6EECF244321}">
-                <p14:modId xmlns="" xmlns:p14="http://schemas.microsoft.com/office/powerpoint/2010/main" val="2952445889"/>
+                <p14:modId xmlns:p14="http://schemas.microsoft.com/office/powerpoint/2010/main" val="2952445889"/>
               </p:ext>
             </p:extLst>
           </p:nvPr>
         </p:nvGraphicFramePr>
         <p:xfrm>
           <a:off x="254000" y="2944678"/>
-          <a:ext cx="8686799" cy="3194090"/>
+          <a:ext cx="8686799" cy="3235365"/>
         </p:xfrm>
         <a:graphic>
           <a:graphicData uri="http://schemas.openxmlformats.org/drawingml/2006/table">
@@ -14099,7 +14194,7 @@
     </p:spTree>
     <p:extLst>
       <p:ext uri="{BB962C8B-B14F-4D97-AF65-F5344CB8AC3E}">
-        <p14:creationId xmlns="" xmlns:p14="http://schemas.microsoft.com/office/powerpoint/2010/main" val="83792608"/>
+        <p14:creationId xmlns:p14="http://schemas.microsoft.com/office/powerpoint/2010/main" val="83792608"/>
       </p:ext>
     </p:extLst>
   </p:cSld>
@@ -14109,7 +14204,7 @@
   <p:timing>
     <p:tnLst>
       <p:par>
-        <p:cTn id="1" dur="indefinite" restart="never" nodeType="tmRoot"/>
+        <p:cTn xmlns:p14="http://schemas.microsoft.com/office/powerpoint/2010/main" id="1" dur="indefinite" restart="never" nodeType="tmRoot"/>
       </p:par>
     </p:tnLst>
   </p:timing>
@@ -14435,7 +14530,7 @@
     </p:spTree>
     <p:extLst>
       <p:ext uri="{BB962C8B-B14F-4D97-AF65-F5344CB8AC3E}">
-        <p14:creationId xmlns="" xmlns:p14="http://schemas.microsoft.com/office/powerpoint/2010/main" val="1195116925"/>
+        <p14:creationId xmlns:p14="http://schemas.microsoft.com/office/powerpoint/2010/main" val="1195116925"/>
       </p:ext>
     </p:extLst>
   </p:cSld>
@@ -14445,7 +14540,7 @@
   <p:timing>
     <p:tnLst>
       <p:par>
-        <p:cTn id="1" dur="indefinite" restart="never" nodeType="tmRoot"/>
+        <p:cTn xmlns:p14="http://schemas.microsoft.com/office/powerpoint/2010/main" id="1" dur="indefinite" restart="never" nodeType="tmRoot"/>
       </p:par>
     </p:tnLst>
   </p:timing>

</xml_diff>

<commit_message>
minor changes based on tuesday's demos
</commit_message>
<xml_diff>
--- a/docs/Presentation_TeamGamma.pptx
+++ b/docs/Presentation_TeamGamma.pptx
@@ -11,8 +11,8 @@
     <p:sldId id="256" r:id="rId2"/>
     <p:sldId id="257" r:id="rId3"/>
     <p:sldId id="258" r:id="rId4"/>
-    <p:sldId id="267" r:id="rId5"/>
-    <p:sldId id="259" r:id="rId6"/>
+    <p:sldId id="259" r:id="rId5"/>
+    <p:sldId id="267" r:id="rId6"/>
     <p:sldId id="260" r:id="rId7"/>
     <p:sldId id="264" r:id="rId8"/>
     <p:sldId id="261" r:id="rId9"/>
@@ -121,17 +121,7 @@
 
 <file path=ppt/charts/chart1.xml><?xml version="1.0" encoding="utf-8"?>
 <c:chartSpace xmlns:c="http://schemas.openxmlformats.org/drawingml/2006/chart" xmlns:a="http://schemas.openxmlformats.org/drawingml/2006/main" xmlns:r="http://schemas.openxmlformats.org/officeDocument/2006/relationships">
-  <c:date1904 val="0"/>
   <c:lang val="en-US"/>
-  <c:roundedCorners val="0"/>
-  <mc:AlternateContent xmlns:mc="http://schemas.openxmlformats.org/markup-compatibility/2006">
-    <mc:Choice xmlns:c14="http://schemas.microsoft.com/office/drawing/2007/8/2/chart" Requires="c14">
-      <c14:style val="102"/>
-    </mc:Choice>
-    <mc:Fallback>
-      <c:style val="2"/>
-    </mc:Fallback>
-  </mc:AlternateContent>
   <c:chart>
     <c:title>
       <c:tx>
@@ -149,8 +139,6 @@
           </a:p>
         </c:rich>
       </c:tx>
-      <c:layout/>
-      <c:overlay val="0"/>
       <c:spPr>
         <a:noFill/>
         <a:ln w="25400">
@@ -158,7 +146,6 @@
         </a:ln>
       </c:spPr>
     </c:title>
-    <c:autoTitleDeleted val="0"/>
     <c:plotArea>
       <c:layout>
         <c:manualLayout>
@@ -166,14 +153,13 @@
           <c:xMode val="edge"/>
           <c:yMode val="edge"/>
           <c:x val="0.12857427475031"/>
-          <c:y val="0.138477097142518"/>
-          <c:w val="0.816109421965819"/>
-          <c:h val="0.735528567403651"/>
+          <c:y val="0.13847709714251807"/>
+          <c:w val="0.81610942196581904"/>
+          <c:h val="0.73552856740365102"/>
         </c:manualLayout>
       </c:layout>
       <c:lineChart>
         <c:grouping val="standard"/>
-        <c:varyColors val="0"/>
         <c:ser>
           <c:idx val="0"/>
           <c:order val="0"/>
@@ -218,67 +204,67 @@
                 <c:formatCode>General</c:formatCode>
                 <c:ptCount val="21"/>
                 <c:pt idx="0">
-                  <c:v>1.0</c:v>
+                  <c:v>1</c:v>
                 </c:pt>
                 <c:pt idx="1">
-                  <c:v>2.0</c:v>
+                  <c:v>2</c:v>
                 </c:pt>
                 <c:pt idx="2">
-                  <c:v>3.0</c:v>
+                  <c:v>3</c:v>
                 </c:pt>
                 <c:pt idx="3">
-                  <c:v>4.0</c:v>
+                  <c:v>4</c:v>
                 </c:pt>
                 <c:pt idx="4">
-                  <c:v>5.0</c:v>
+                  <c:v>5</c:v>
                 </c:pt>
                 <c:pt idx="5">
-                  <c:v>6.0</c:v>
+                  <c:v>6</c:v>
                 </c:pt>
                 <c:pt idx="6">
-                  <c:v>7.0</c:v>
+                  <c:v>7</c:v>
                 </c:pt>
                 <c:pt idx="7">
-                  <c:v>8.0</c:v>
+                  <c:v>8</c:v>
                 </c:pt>
                 <c:pt idx="8">
-                  <c:v>9.0</c:v>
+                  <c:v>9</c:v>
                 </c:pt>
                 <c:pt idx="9">
-                  <c:v>10.0</c:v>
+                  <c:v>10</c:v>
                 </c:pt>
                 <c:pt idx="10">
-                  <c:v>11.0</c:v>
+                  <c:v>11</c:v>
                 </c:pt>
                 <c:pt idx="11">
-                  <c:v>12.0</c:v>
+                  <c:v>12</c:v>
                 </c:pt>
                 <c:pt idx="12">
-                  <c:v>13.0</c:v>
+                  <c:v>13</c:v>
                 </c:pt>
                 <c:pt idx="13">
-                  <c:v>14.0</c:v>
+                  <c:v>14</c:v>
                 </c:pt>
                 <c:pt idx="14">
-                  <c:v>15.0</c:v>
+                  <c:v>15</c:v>
                 </c:pt>
                 <c:pt idx="15">
-                  <c:v>16.0</c:v>
+                  <c:v>16</c:v>
                 </c:pt>
                 <c:pt idx="16">
-                  <c:v>17.0</c:v>
+                  <c:v>17</c:v>
                 </c:pt>
                 <c:pt idx="17">
-                  <c:v>18.0</c:v>
+                  <c:v>18</c:v>
                 </c:pt>
                 <c:pt idx="18">
-                  <c:v>19.0</c:v>
+                  <c:v>19</c:v>
                 </c:pt>
                 <c:pt idx="19">
-                  <c:v>20.0</c:v>
+                  <c:v>20</c:v>
                 </c:pt>
                 <c:pt idx="20">
-                  <c:v>21.0</c:v>
+                  <c:v>21</c:v>
                 </c:pt>
               </c:numCache>
             </c:numRef>
@@ -290,72 +276,71 @@
                 <c:formatCode>0.00</c:formatCode>
                 <c:ptCount val="21"/>
                 <c:pt idx="0">
-                  <c:v>37.0</c:v>
+                  <c:v>37</c:v>
                 </c:pt>
                 <c:pt idx="1">
-                  <c:v>35.23809523809525</c:v>
+                  <c:v>35.238095238095276</c:v>
                 </c:pt>
                 <c:pt idx="2">
-                  <c:v>33.47619047619047</c:v>
+                  <c:v>33.476190476190453</c:v>
                 </c:pt>
                 <c:pt idx="3">
-                  <c:v>31.71428571428572</c:v>
+                  <c:v>31.714285714285737</c:v>
                 </c:pt>
                 <c:pt idx="4">
-                  <c:v>29.95238095238095</c:v>
+                  <c:v>29.952380952380931</c:v>
                 </c:pt>
                 <c:pt idx="5">
                   <c:v>28.19047619047619</c:v>
                 </c:pt>
                 <c:pt idx="6">
-                  <c:v>26.42857142857143</c:v>
+                  <c:v>26.428571428571427</c:v>
                 </c:pt>
                 <c:pt idx="7">
-                  <c:v>24.66666666666667</c:v>
+                  <c:v>24.666666666666671</c:v>
                 </c:pt>
                 <c:pt idx="8">
-                  <c:v>22.9047619047619</c:v>
+                  <c:v>22.904761904761884</c:v>
                 </c:pt>
                 <c:pt idx="9">
-                  <c:v>21.14285714285715</c:v>
+                  <c:v>21.14285714285716</c:v>
                 </c:pt>
                 <c:pt idx="10">
                   <c:v>19.38095238095238</c:v>
                 </c:pt>
                 <c:pt idx="11">
-                  <c:v>17.61904761904762</c:v>
+                  <c:v>17.619047619047631</c:v>
                 </c:pt>
                 <c:pt idx="12">
-                  <c:v>15.85714285714286</c:v>
+                  <c:v>15.85714285714287</c:v>
                 </c:pt>
                 <c:pt idx="13">
                   <c:v>14.0952380952381</c:v>
                 </c:pt>
                 <c:pt idx="14">
-                  <c:v>12.33333333333334</c:v>
+                  <c:v>12.333333333333345</c:v>
                 </c:pt>
                 <c:pt idx="15">
-                  <c:v>10.57142857142857</c:v>
+                  <c:v>10.571428571428569</c:v>
                 </c:pt>
                 <c:pt idx="16">
-                  <c:v>8.80952380952381</c:v>
+                  <c:v>8.8095238095238155</c:v>
                 </c:pt>
                 <c:pt idx="17">
-                  <c:v>7.047619047619047</c:v>
+                  <c:v>7.0476190476190466</c:v>
                 </c:pt>
                 <c:pt idx="18">
-                  <c:v>5.285714285714285</c:v>
+                  <c:v>5.2857142857142874</c:v>
                 </c:pt>
                 <c:pt idx="19">
-                  <c:v>3.523809523809525</c:v>
+                  <c:v>3.5238095238095237</c:v>
                 </c:pt>
                 <c:pt idx="20">
-                  <c:v>1.761904761904759</c:v>
+                  <c:v>1.7619047619047596</c:v>
                 </c:pt>
               </c:numCache>
             </c:numRef>
           </c:val>
-          <c:smooth val="0"/>
         </c:ser>
         <c:ser>
           <c:idx val="1"/>
@@ -401,67 +386,67 @@
                 <c:formatCode>General</c:formatCode>
                 <c:ptCount val="21"/>
                 <c:pt idx="0">
-                  <c:v>1.0</c:v>
+                  <c:v>1</c:v>
                 </c:pt>
                 <c:pt idx="1">
-                  <c:v>2.0</c:v>
+                  <c:v>2</c:v>
                 </c:pt>
                 <c:pt idx="2">
-                  <c:v>3.0</c:v>
+                  <c:v>3</c:v>
                 </c:pt>
                 <c:pt idx="3">
-                  <c:v>4.0</c:v>
+                  <c:v>4</c:v>
                 </c:pt>
                 <c:pt idx="4">
-                  <c:v>5.0</c:v>
+                  <c:v>5</c:v>
                 </c:pt>
                 <c:pt idx="5">
-                  <c:v>6.0</c:v>
+                  <c:v>6</c:v>
                 </c:pt>
                 <c:pt idx="6">
-                  <c:v>7.0</c:v>
+                  <c:v>7</c:v>
                 </c:pt>
                 <c:pt idx="7">
-                  <c:v>8.0</c:v>
+                  <c:v>8</c:v>
                 </c:pt>
                 <c:pt idx="8">
-                  <c:v>9.0</c:v>
+                  <c:v>9</c:v>
                 </c:pt>
                 <c:pt idx="9">
-                  <c:v>10.0</c:v>
+                  <c:v>10</c:v>
                 </c:pt>
                 <c:pt idx="10">
-                  <c:v>11.0</c:v>
+                  <c:v>11</c:v>
                 </c:pt>
                 <c:pt idx="11">
-                  <c:v>12.0</c:v>
+                  <c:v>12</c:v>
                 </c:pt>
                 <c:pt idx="12">
-                  <c:v>13.0</c:v>
+                  <c:v>13</c:v>
                 </c:pt>
                 <c:pt idx="13">
-                  <c:v>14.0</c:v>
+                  <c:v>14</c:v>
                 </c:pt>
                 <c:pt idx="14">
-                  <c:v>15.0</c:v>
+                  <c:v>15</c:v>
                 </c:pt>
                 <c:pt idx="15">
-                  <c:v>16.0</c:v>
+                  <c:v>16</c:v>
                 </c:pt>
                 <c:pt idx="16">
-                  <c:v>17.0</c:v>
+                  <c:v>17</c:v>
                 </c:pt>
                 <c:pt idx="17">
-                  <c:v>18.0</c:v>
+                  <c:v>18</c:v>
                 </c:pt>
                 <c:pt idx="18">
-                  <c:v>19.0</c:v>
+                  <c:v>19</c:v>
                 </c:pt>
                 <c:pt idx="19">
-                  <c:v>20.0</c:v>
+                  <c:v>20</c:v>
                 </c:pt>
                 <c:pt idx="20">
-                  <c:v>21.0</c:v>
+                  <c:v>21</c:v>
                 </c:pt>
               </c:numCache>
             </c:numRef>
@@ -473,92 +458,81 @@
                 <c:formatCode>0.00</c:formatCode>
                 <c:ptCount val="21"/>
                 <c:pt idx="0">
-                  <c:v>37.0</c:v>
+                  <c:v>37</c:v>
                 </c:pt>
                 <c:pt idx="1">
-                  <c:v>36.0</c:v>
+                  <c:v>36</c:v>
                 </c:pt>
                 <c:pt idx="2">
-                  <c:v>35.0</c:v>
+                  <c:v>35</c:v>
                 </c:pt>
                 <c:pt idx="3">
-                  <c:v>33.0</c:v>
+                  <c:v>33</c:v>
                 </c:pt>
                 <c:pt idx="4">
-                  <c:v>38.0</c:v>
+                  <c:v>38</c:v>
                 </c:pt>
                 <c:pt idx="5">
-                  <c:v>33.0</c:v>
+                  <c:v>33</c:v>
                 </c:pt>
                 <c:pt idx="6">
-                  <c:v>29.0</c:v>
+                  <c:v>29</c:v>
                 </c:pt>
                 <c:pt idx="7">
-                  <c:v>27.0</c:v>
+                  <c:v>27</c:v>
                 </c:pt>
                 <c:pt idx="8">
-                  <c:v>27.0</c:v>
+                  <c:v>27</c:v>
                 </c:pt>
                 <c:pt idx="9">
-                  <c:v>25.0</c:v>
+                  <c:v>25</c:v>
                 </c:pt>
                 <c:pt idx="10">
-                  <c:v>23.0</c:v>
+                  <c:v>23</c:v>
                 </c:pt>
                 <c:pt idx="11">
-                  <c:v>21.0</c:v>
+                  <c:v>21</c:v>
                 </c:pt>
                 <c:pt idx="12">
-                  <c:v>17.0</c:v>
+                  <c:v>17</c:v>
                 </c:pt>
                 <c:pt idx="13">
-                  <c:v>15.0</c:v>
+                  <c:v>15</c:v>
                 </c:pt>
                 <c:pt idx="14">
-                  <c:v>12.0</c:v>
+                  <c:v>12</c:v>
                 </c:pt>
                 <c:pt idx="15">
-                  <c:v>10.0</c:v>
+                  <c:v>10</c:v>
                 </c:pt>
                 <c:pt idx="16">
-                  <c:v>7.0</c:v>
+                  <c:v>7</c:v>
                 </c:pt>
                 <c:pt idx="17">
-                  <c:v>4.0</c:v>
+                  <c:v>4</c:v>
                 </c:pt>
                 <c:pt idx="18">
-                  <c:v>1.0</c:v>
+                  <c:v>1</c:v>
                 </c:pt>
                 <c:pt idx="19">
-                  <c:v>0.0</c:v>
+                  <c:v>0</c:v>
                 </c:pt>
                 <c:pt idx="20">
-                  <c:v>0.0</c:v>
+                  <c:v>0</c:v>
                 </c:pt>
               </c:numCache>
             </c:numRef>
           </c:val>
-          <c:smooth val="0"/>
         </c:ser>
-        <c:dLbls>
-          <c:showLegendKey val="0"/>
-          <c:showVal val="0"/>
-          <c:showCatName val="0"/>
-          <c:showSerName val="0"/>
-          <c:showPercent val="0"/>
-          <c:showBubbleSize val="0"/>
-        </c:dLbls>
         <c:marker val="1"/>
-        <c:smooth val="0"/>
-        <c:axId val="-2087225096"/>
-        <c:axId val="-2108365944"/>
+        <c:axId val="73970432"/>
+        <c:axId val="73972736"/>
       </c:lineChart>
       <c:catAx>
-        <c:axId val="-2087225096"/>
+        <c:axId val="73970432"/>
         <c:scaling>
           <c:orientation val="minMax"/>
         </c:scaling>
-        <c:delete val="0"/>
         <c:axPos val="b"/>
         <c:title>
           <c:tx>
@@ -576,8 +550,6 @@
               </a:p>
             </c:rich>
           </c:tx>
-          <c:layout/>
-          <c:overlay val="0"/>
           <c:spPr>
             <a:noFill/>
             <a:ln w="25400">
@@ -586,8 +558,6 @@
           </c:spPr>
         </c:title>
         <c:numFmt formatCode="General" sourceLinked="1"/>
-        <c:majorTickMark val="out"/>
-        <c:minorTickMark val="none"/>
         <c:tickLblPos val="nextTo"/>
         <c:spPr>
           <a:ln w="3175">
@@ -607,19 +577,16 @@
             <a:endParaRPr lang="en-US"/>
           </a:p>
         </c:txPr>
-        <c:crossAx val="-2108365944"/>
+        <c:crossAx val="73972736"/>
         <c:crosses val="autoZero"/>
-        <c:auto val="0"/>
         <c:lblAlgn val="ctr"/>
         <c:lblOffset val="100"/>
-        <c:noMultiLvlLbl val="0"/>
       </c:catAx>
       <c:valAx>
-        <c:axId val="-2108365944"/>
+        <c:axId val="73972736"/>
         <c:scaling>
           <c:orientation val="minMax"/>
         </c:scaling>
-        <c:delete val="0"/>
         <c:axPos val="l"/>
         <c:majorGridlines>
           <c:spPr>
@@ -647,8 +614,6 @@
               </a:p>
             </c:rich>
           </c:tx>
-          <c:layout/>
-          <c:overlay val="0"/>
           <c:spPr>
             <a:noFill/>
             <a:ln w="25400">
@@ -657,8 +622,6 @@
           </c:spPr>
         </c:title>
         <c:numFmt formatCode="0.00" sourceLinked="1"/>
-        <c:majorTickMark val="out"/>
-        <c:minorTickMark val="none"/>
         <c:tickLblPos val="nextTo"/>
         <c:spPr>
           <a:ln w="9525">
@@ -675,7 +638,7 @@
             <a:endParaRPr lang="en-US"/>
           </a:p>
         </c:txPr>
-        <c:crossAx val="-2087225096"/>
+        <c:crossAx val="73970432"/>
         <c:crosses val="autoZero"/>
         <c:crossBetween val="between"/>
       </c:valAx>
@@ -694,13 +657,12 @@
         <c:manualLayout>
           <c:xMode val="edge"/>
           <c:yMode val="edge"/>
-          <c:x val="0.322742036400217"/>
+          <c:x val="0.32274203640021693"/>
           <c:y val="0.162826909604848"/>
-          <c:w val="0.674800137096401"/>
-          <c:h val="0.0585268507669827"/>
+          <c:w val="0.67480013709640163"/>
+          <c:h val="5.8526850766982705E-2"/>
         </c:manualLayout>
       </c:layout>
-      <c:overlay val="0"/>
       <c:spPr>
         <a:noFill/>
         <a:ln w="25400">
@@ -708,9 +670,7 @@
         </a:ln>
       </c:spPr>
     </c:legend>
-    <c:plotVisOnly val="0"/>
     <c:dispBlanksAs val="gap"/>
-    <c:showDLblsOverMax val="0"/>
   </c:chart>
   <c:spPr>
     <a:solidFill>
@@ -723,25 +683,13 @@
       <a:prstDash val="solid"/>
     </a:ln>
   </c:spPr>
-  <c:externalData r:id="rId1">
-    <c:autoUpdate val="0"/>
-  </c:externalData>
+  <c:externalData r:id="rId1"/>
 </c:chartSpace>
 </file>
 
 <file path=ppt/charts/chart2.xml><?xml version="1.0" encoding="utf-8"?>
 <c:chartSpace xmlns:c="http://schemas.openxmlformats.org/drawingml/2006/chart" xmlns:a="http://schemas.openxmlformats.org/drawingml/2006/main" xmlns:r="http://schemas.openxmlformats.org/officeDocument/2006/relationships">
-  <c:date1904 val="0"/>
   <c:lang val="en-US"/>
-  <c:roundedCorners val="0"/>
-  <mc:AlternateContent xmlns:mc="http://schemas.openxmlformats.org/markup-compatibility/2006">
-    <mc:Choice xmlns:c14="http://schemas.microsoft.com/office/drawing/2007/8/2/chart" Requires="c14">
-      <c14:style val="102"/>
-    </mc:Choice>
-    <mc:Fallback>
-      <c:style val="2"/>
-    </mc:Fallback>
-  </mc:AlternateContent>
   <c:chart>
     <c:title>
       <c:tx>
@@ -759,8 +707,6 @@
           </a:p>
         </c:rich>
       </c:tx>
-      <c:layout/>
-      <c:overlay val="0"/>
       <c:spPr>
         <a:noFill/>
         <a:ln w="25400">
@@ -768,22 +714,20 @@
         </a:ln>
       </c:spPr>
     </c:title>
-    <c:autoTitleDeleted val="0"/>
     <c:plotArea>
       <c:layout>
         <c:manualLayout>
           <c:layoutTarget val="inner"/>
           <c:xMode val="edge"/>
           <c:yMode val="edge"/>
-          <c:x val="0.0827068428274448"/>
-          <c:y val="0.176744186046512"/>
-          <c:w val="0.896617364288435"/>
-          <c:h val="0.595348837209303"/>
+          <c:x val="8.2706842827444851E-2"/>
+          <c:y val="0.17674418604651213"/>
+          <c:w val="0.89661736428843497"/>
+          <c:h val="0.59534883720930332"/>
         </c:manualLayout>
       </c:layout>
       <c:lineChart>
         <c:grouping val="standard"/>
-        <c:varyColors val="0"/>
         <c:ser>
           <c:idx val="0"/>
           <c:order val="0"/>
@@ -828,46 +772,46 @@
                 <c:formatCode>General</c:formatCode>
                 <c:ptCount val="14"/>
                 <c:pt idx="0">
-                  <c:v>1.0</c:v>
+                  <c:v>1</c:v>
                 </c:pt>
                 <c:pt idx="1">
-                  <c:v>2.0</c:v>
+                  <c:v>2</c:v>
                 </c:pt>
                 <c:pt idx="2">
-                  <c:v>3.0</c:v>
+                  <c:v>3</c:v>
                 </c:pt>
                 <c:pt idx="3">
-                  <c:v>4.0</c:v>
+                  <c:v>4</c:v>
                 </c:pt>
                 <c:pt idx="4">
-                  <c:v>5.0</c:v>
+                  <c:v>5</c:v>
                 </c:pt>
                 <c:pt idx="5">
-                  <c:v>6.0</c:v>
+                  <c:v>6</c:v>
                 </c:pt>
                 <c:pt idx="6">
-                  <c:v>7.0</c:v>
+                  <c:v>7</c:v>
                 </c:pt>
                 <c:pt idx="7">
-                  <c:v>8.0</c:v>
+                  <c:v>8</c:v>
                 </c:pt>
                 <c:pt idx="8">
-                  <c:v>9.0</c:v>
+                  <c:v>9</c:v>
                 </c:pt>
                 <c:pt idx="9">
-                  <c:v>10.0</c:v>
+                  <c:v>10</c:v>
                 </c:pt>
                 <c:pt idx="10">
-                  <c:v>11.0</c:v>
+                  <c:v>11</c:v>
                 </c:pt>
                 <c:pt idx="11">
-                  <c:v>12.0</c:v>
+                  <c:v>12</c:v>
                 </c:pt>
                 <c:pt idx="12">
-                  <c:v>13.0</c:v>
+                  <c:v>13</c:v>
                 </c:pt>
                 <c:pt idx="13">
-                  <c:v>14.0</c:v>
+                  <c:v>14</c:v>
                 </c:pt>
               </c:numCache>
             </c:numRef>
@@ -879,51 +823,50 @@
                 <c:formatCode>General</c:formatCode>
                 <c:ptCount val="14"/>
                 <c:pt idx="0">
-                  <c:v>39.0</c:v>
+                  <c:v>39</c:v>
                 </c:pt>
                 <c:pt idx="1">
-                  <c:v>36.21428571428572</c:v>
+                  <c:v>36.214285714285722</c:v>
                 </c:pt>
                 <c:pt idx="2">
-                  <c:v>33.42857142857143</c:v>
+                  <c:v>33.428571428571459</c:v>
                 </c:pt>
                 <c:pt idx="3">
-                  <c:v>30.64285714285715</c:v>
+                  <c:v>30.64285714285716</c:v>
                 </c:pt>
                 <c:pt idx="4">
-                  <c:v>27.85714285714285</c:v>
+                  <c:v>27.85714285714284</c:v>
                 </c:pt>
                 <c:pt idx="5">
-                  <c:v>25.07142857142857</c:v>
+                  <c:v>25.071428571428569</c:v>
                 </c:pt>
                 <c:pt idx="6">
-                  <c:v>22.28571428571428</c:v>
+                  <c:v>22.28571428571426</c:v>
                 </c:pt>
                 <c:pt idx="7">
                   <c:v>19.5</c:v>
                 </c:pt>
                 <c:pt idx="8">
-                  <c:v>16.71428571428572</c:v>
+                  <c:v>16.714285714285737</c:v>
                 </c:pt>
                 <c:pt idx="9">
-                  <c:v>13.92857142857143</c:v>
+                  <c:v>13.92857142857142</c:v>
                 </c:pt>
                 <c:pt idx="10">
-                  <c:v>11.14285714285714</c:v>
+                  <c:v>11.142857142857135</c:v>
                 </c:pt>
                 <c:pt idx="11">
-                  <c:v>8.35714285714286</c:v>
+                  <c:v>8.3571428571428683</c:v>
                 </c:pt>
                 <c:pt idx="12">
-                  <c:v>5.57142857142857</c:v>
+                  <c:v>5.5714285714285703</c:v>
                 </c:pt>
                 <c:pt idx="13">
-                  <c:v>2.785714285714285</c:v>
+                  <c:v>2.7857142857142851</c:v>
                 </c:pt>
               </c:numCache>
             </c:numRef>
           </c:val>
-          <c:smooth val="0"/>
         </c:ser>
         <c:ser>
           <c:idx val="1"/>
@@ -969,46 +912,46 @@
                 <c:formatCode>General</c:formatCode>
                 <c:ptCount val="14"/>
                 <c:pt idx="0">
-                  <c:v>1.0</c:v>
+                  <c:v>1</c:v>
                 </c:pt>
                 <c:pt idx="1">
-                  <c:v>2.0</c:v>
+                  <c:v>2</c:v>
                 </c:pt>
                 <c:pt idx="2">
-                  <c:v>3.0</c:v>
+                  <c:v>3</c:v>
                 </c:pt>
                 <c:pt idx="3">
-                  <c:v>4.0</c:v>
+                  <c:v>4</c:v>
                 </c:pt>
                 <c:pt idx="4">
-                  <c:v>5.0</c:v>
+                  <c:v>5</c:v>
                 </c:pt>
                 <c:pt idx="5">
-                  <c:v>6.0</c:v>
+                  <c:v>6</c:v>
                 </c:pt>
                 <c:pt idx="6">
-                  <c:v>7.0</c:v>
+                  <c:v>7</c:v>
                 </c:pt>
                 <c:pt idx="7">
-                  <c:v>8.0</c:v>
+                  <c:v>8</c:v>
                 </c:pt>
                 <c:pt idx="8">
-                  <c:v>9.0</c:v>
+                  <c:v>9</c:v>
                 </c:pt>
                 <c:pt idx="9">
-                  <c:v>10.0</c:v>
+                  <c:v>10</c:v>
                 </c:pt>
                 <c:pt idx="10">
-                  <c:v>11.0</c:v>
+                  <c:v>11</c:v>
                 </c:pt>
                 <c:pt idx="11">
-                  <c:v>12.0</c:v>
+                  <c:v>12</c:v>
                 </c:pt>
                 <c:pt idx="12">
-                  <c:v>13.0</c:v>
+                  <c:v>13</c:v>
                 </c:pt>
                 <c:pt idx="13">
-                  <c:v>14.0</c:v>
+                  <c:v>14</c:v>
                 </c:pt>
               </c:numCache>
             </c:numRef>
@@ -1020,13 +963,13 @@
                 <c:formatCode>General</c:formatCode>
                 <c:ptCount val="14"/>
                 <c:pt idx="0">
-                  <c:v>39.0</c:v>
+                  <c:v>39</c:v>
                 </c:pt>
                 <c:pt idx="1">
-                  <c:v>37.0</c:v>
+                  <c:v>37</c:v>
                 </c:pt>
                 <c:pt idx="2">
-                  <c:v>33.0</c:v>
+                  <c:v>33</c:v>
                 </c:pt>
                 <c:pt idx="3">
                   <c:v>31.5</c:v>
@@ -1035,13 +978,13 @@
                   <c:v>29.5</c:v>
                 </c:pt>
                 <c:pt idx="5">
-                  <c:v>27.0</c:v>
+                  <c:v>27</c:v>
                 </c:pt>
                 <c:pt idx="6">
-                  <c:v>23.0</c:v>
+                  <c:v>23</c:v>
                 </c:pt>
                 <c:pt idx="7">
-                  <c:v>19.0</c:v>
+                  <c:v>19</c:v>
                 </c:pt>
                 <c:pt idx="8">
                   <c:v>19.5</c:v>
@@ -1053,38 +996,27 @@
                   <c:v>10.5</c:v>
                 </c:pt>
                 <c:pt idx="11">
-                  <c:v>8.0</c:v>
+                  <c:v>8</c:v>
                 </c:pt>
                 <c:pt idx="12">
-                  <c:v>2.0</c:v>
+                  <c:v>2</c:v>
                 </c:pt>
                 <c:pt idx="13">
-                  <c:v>0.0</c:v>
+                  <c:v>0</c:v>
                 </c:pt>
               </c:numCache>
             </c:numRef>
           </c:val>
-          <c:smooth val="0"/>
         </c:ser>
-        <c:dLbls>
-          <c:showLegendKey val="0"/>
-          <c:showVal val="0"/>
-          <c:showCatName val="0"/>
-          <c:showSerName val="0"/>
-          <c:showPercent val="0"/>
-          <c:showBubbleSize val="0"/>
-        </c:dLbls>
         <c:marker val="1"/>
-        <c:smooth val="0"/>
-        <c:axId val="-2112691880"/>
-        <c:axId val="-2112448024"/>
+        <c:axId val="75163520"/>
+        <c:axId val="78729600"/>
       </c:lineChart>
       <c:catAx>
-        <c:axId val="-2112691880"/>
+        <c:axId val="75163520"/>
         <c:scaling>
           <c:orientation val="minMax"/>
         </c:scaling>
-        <c:delete val="0"/>
         <c:axPos val="b"/>
         <c:title>
           <c:tx>
@@ -1102,8 +1034,6 @@
               </a:p>
             </c:rich>
           </c:tx>
-          <c:layout/>
-          <c:overlay val="0"/>
           <c:spPr>
             <a:noFill/>
             <a:ln w="25400">
@@ -1112,8 +1042,6 @@
           </c:spPr>
         </c:title>
         <c:numFmt formatCode="General" sourceLinked="1"/>
-        <c:majorTickMark val="out"/>
-        <c:minorTickMark val="none"/>
         <c:tickLblPos val="nextTo"/>
         <c:spPr>
           <a:ln w="3175">
@@ -1133,19 +1061,16 @@
             <a:endParaRPr lang="en-US"/>
           </a:p>
         </c:txPr>
-        <c:crossAx val="-2112448024"/>
+        <c:crossAx val="78729600"/>
         <c:crosses val="autoZero"/>
-        <c:auto val="0"/>
         <c:lblAlgn val="ctr"/>
         <c:lblOffset val="100"/>
-        <c:noMultiLvlLbl val="0"/>
       </c:catAx>
       <c:valAx>
-        <c:axId val="-2112448024"/>
+        <c:axId val="78729600"/>
         <c:scaling>
           <c:orientation val="minMax"/>
         </c:scaling>
-        <c:delete val="0"/>
         <c:axPos val="l"/>
         <c:majorGridlines>
           <c:spPr>
@@ -1173,8 +1098,6 @@
               </a:p>
             </c:rich>
           </c:tx>
-          <c:layout/>
-          <c:overlay val="0"/>
           <c:spPr>
             <a:noFill/>
             <a:ln w="25400">
@@ -1183,8 +1106,6 @@
           </c:spPr>
         </c:title>
         <c:numFmt formatCode="General" sourceLinked="1"/>
-        <c:majorTickMark val="out"/>
-        <c:minorTickMark val="none"/>
         <c:tickLblPos val="nextTo"/>
         <c:spPr>
           <a:ln w="9525">
@@ -1201,7 +1122,7 @@
             <a:endParaRPr lang="en-US"/>
           </a:p>
         </c:txPr>
-        <c:crossAx val="-2112691880"/>
+        <c:crossAx val="75163520"/>
         <c:crosses val="autoZero"/>
         <c:crossBetween val="between"/>
       </c:valAx>
@@ -1220,17 +1141,14 @@
         <c:manualLayout>
           <c:xMode val="edge"/>
           <c:yMode val="edge"/>
-          <c:x val="0.293693693693694"/>
-          <c:y val="0.180354281776375"/>
-          <c:w val="0.670506898952817"/>
-          <c:h val="0.0521351935254739"/>
+          <c:x val="0.29369369369369402"/>
+          <c:y val="0.18035428177637516"/>
+          <c:w val="0.67050689895281701"/>
+          <c:h val="5.2135193525473911E-2"/>
         </c:manualLayout>
       </c:layout>
-      <c:overlay val="0"/>
     </c:legend>
-    <c:plotVisOnly val="0"/>
     <c:dispBlanksAs val="gap"/>
-    <c:showDLblsOverMax val="0"/>
   </c:chart>
   <c:spPr>
     <a:solidFill>
@@ -1243,9 +1161,7 @@
       <a:prstDash val="solid"/>
     </a:ln>
   </c:spPr>
-  <c:externalData r:id="rId1">
-    <c:autoUpdate val="0"/>
-  </c:externalData>
+  <c:externalData r:id="rId1"/>
 </c:chartSpace>
 </file>
 
@@ -1332,7 +1248,7 @@
             <a:fld id="{12CDBA90-CDB2-9846-BC3C-C942DFE4778C}" type="datetimeFigureOut">
               <a:rPr lang="en-US" smtClean="0"/>
               <a:pPr/>
-              <a:t>11/25/12</a:t>
+              <a:t>11/28/2012</a:t>
             </a:fld>
             <a:endParaRPr lang="en-US" dirty="0"/>
           </a:p>
@@ -1501,7 +1417,7 @@
     </p:spTree>
     <p:extLst>
       <p:ext uri="{BB962C8B-B14F-4D97-AF65-F5344CB8AC3E}">
-        <p14:creationId xmlns:p14="http://schemas.microsoft.com/office/powerpoint/2010/main" val="2212999972"/>
+        <p14:creationId xmlns:p14="http://schemas.microsoft.com/office/powerpoint/2010/main" xmlns="" val="2212999972"/>
       </p:ext>
     </p:extLst>
   </p:cSld>
@@ -1790,7 +1706,7 @@
     </p:spTree>
     <p:extLst>
       <p:ext uri="{BB962C8B-B14F-4D97-AF65-F5344CB8AC3E}">
-        <p14:creationId xmlns:p14="http://schemas.microsoft.com/office/powerpoint/2010/main" val="385254405"/>
+        <p14:creationId xmlns:p14="http://schemas.microsoft.com/office/powerpoint/2010/main" xmlns="" val="385254405"/>
       </p:ext>
     </p:extLst>
   </p:cSld>
@@ -1848,7 +1764,7 @@
           <a:p>
             <a:r>
               <a:rPr lang="en-US" dirty="0" smtClean="0"/>
-              <a:t>Team</a:t>
+              <a:t>Sheila</a:t>
             </a:r>
             <a:endParaRPr lang="en-US" dirty="0"/>
           </a:p>
@@ -1934,7 +1850,7 @@
           <a:p>
             <a:r>
               <a:rPr lang="en-US" dirty="0" smtClean="0"/>
-              <a:t>Sheila</a:t>
+              <a:t>Team</a:t>
             </a:r>
             <a:endParaRPr lang="en-US" dirty="0"/>
           </a:p>
@@ -2730,7 +2646,7 @@
             <a:fld id="{B1A24CD3-204F-4468-8EE4-28A6668D006A}" type="datetimeFigureOut">
               <a:rPr lang="en-US" smtClean="0"/>
               <a:pPr/>
-              <a:t>11/25/12</a:t>
+              <a:t>11/28/2012</a:t>
             </a:fld>
             <a:endParaRPr lang="en-US" dirty="0"/>
           </a:p>
@@ -3018,7 +2934,7 @@
             <a:fld id="{B1A24CD3-204F-4468-8EE4-28A6668D006A}" type="datetimeFigureOut">
               <a:rPr lang="en-US" smtClean="0"/>
               <a:pPr/>
-              <a:t>11/25/12</a:t>
+              <a:t>11/28/2012</a:t>
             </a:fld>
             <a:endParaRPr lang="en-US" dirty="0"/>
           </a:p>
@@ -3442,7 +3358,7 @@
             <a:fld id="{B1A24CD3-204F-4468-8EE4-28A6668D006A}" type="datetimeFigureOut">
               <a:rPr lang="en-US" smtClean="0"/>
               <a:pPr/>
-              <a:t>11/25/12</a:t>
+              <a:t>11/28/2012</a:t>
             </a:fld>
             <a:endParaRPr lang="en-US" dirty="0"/>
           </a:p>
@@ -3861,7 +3777,7 @@
             <a:fld id="{B1A24CD3-204F-4468-8EE4-28A6668D006A}" type="datetimeFigureOut">
               <a:rPr lang="en-US" smtClean="0"/>
               <a:pPr/>
-              <a:t>11/25/12</a:t>
+              <a:t>11/28/2012</a:t>
             </a:fld>
             <a:endParaRPr lang="en-US" dirty="0"/>
           </a:p>
@@ -3996,7 +3912,7 @@
             <a:fld id="{B1A24CD3-204F-4468-8EE4-28A6668D006A}" type="datetimeFigureOut">
               <a:rPr lang="en-US" smtClean="0"/>
               <a:pPr/>
-              <a:t>11/25/12</a:t>
+              <a:t>11/28/2012</a:t>
             </a:fld>
             <a:endParaRPr lang="en-US" dirty="0"/>
           </a:p>
@@ -4320,7 +4236,7 @@
             <a:fld id="{B1A24CD3-204F-4468-8EE4-28A6668D006A}" type="datetimeFigureOut">
               <a:rPr lang="en-US" smtClean="0"/>
               <a:pPr/>
-              <a:t>11/25/12</a:t>
+              <a:t>11/28/2012</a:t>
             </a:fld>
             <a:endParaRPr lang="en-US" dirty="0"/>
           </a:p>
@@ -4566,7 +4482,7 @@
             <a:fld id="{B1A24CD3-204F-4468-8EE4-28A6668D006A}" type="datetimeFigureOut">
               <a:rPr lang="en-US" smtClean="0"/>
               <a:pPr/>
-              <a:t>11/25/12</a:t>
+              <a:t>11/28/2012</a:t>
             </a:fld>
             <a:endParaRPr lang="en-US" dirty="0"/>
           </a:p>
@@ -4906,7 +4822,7 @@
             <a:fld id="{B1A24CD3-204F-4468-8EE4-28A6668D006A}" type="datetimeFigureOut">
               <a:rPr lang="en-US" smtClean="0"/>
               <a:pPr/>
-              <a:t>11/25/12</a:t>
+              <a:t>11/28/2012</a:t>
             </a:fld>
             <a:endParaRPr lang="en-US" dirty="0"/>
           </a:p>
@@ -5208,7 +5124,7 @@
             <a:fld id="{B1A24CD3-204F-4468-8EE4-28A6668D006A}" type="datetimeFigureOut">
               <a:rPr lang="en-US" smtClean="0"/>
               <a:pPr/>
-              <a:t>11/25/12</a:t>
+              <a:t>11/28/2012</a:t>
             </a:fld>
             <a:endParaRPr lang="en-US" dirty="0"/>
           </a:p>
@@ -5617,7 +5533,7 @@
             <a:fld id="{B1A24CD3-204F-4468-8EE4-28A6668D006A}" type="datetimeFigureOut">
               <a:rPr lang="en-US" smtClean="0"/>
               <a:pPr/>
-              <a:t>11/25/12</a:t>
+              <a:t>11/28/2012</a:t>
             </a:fld>
             <a:endParaRPr lang="en-US" dirty="0"/>
           </a:p>
@@ -5841,7 +5757,7 @@
             <a:fld id="{B1A24CD3-204F-4468-8EE4-28A6668D006A}" type="datetimeFigureOut">
               <a:rPr lang="en-US" smtClean="0"/>
               <a:pPr/>
-              <a:t>11/25/12</a:t>
+              <a:t>11/28/2012</a:t>
             </a:fld>
             <a:endParaRPr lang="en-US" dirty="0"/>
           </a:p>
@@ -6060,7 +5976,7 @@
             <a:fld id="{B1A24CD3-204F-4468-8EE4-28A6668D006A}" type="datetimeFigureOut">
               <a:rPr lang="en-US" smtClean="0"/>
               <a:pPr/>
-              <a:t>11/25/12</a:t>
+              <a:t>11/28/2012</a:t>
             </a:fld>
             <a:endParaRPr lang="en-US" dirty="0"/>
           </a:p>
@@ -6367,7 +6283,7 @@
             <a:fld id="{B1A24CD3-204F-4468-8EE4-28A6668D006A}" type="datetimeFigureOut">
               <a:rPr lang="en-US" smtClean="0"/>
               <a:pPr/>
-              <a:t>11/25/12</a:t>
+              <a:t>11/28/2012</a:t>
             </a:fld>
             <a:endParaRPr lang="en-US" dirty="0"/>
           </a:p>
@@ -6696,7 +6612,7 @@
             <a:fld id="{B1A24CD3-204F-4468-8EE4-28A6668D006A}" type="datetimeFigureOut">
               <a:rPr lang="en-US" smtClean="0"/>
               <a:pPr/>
-              <a:t>11/25/12</a:t>
+              <a:t>11/28/2012</a:t>
             </a:fld>
             <a:endParaRPr lang="en-US" dirty="0"/>
           </a:p>
@@ -7033,7 +6949,7 @@
             <a:fld id="{B1A24CD3-204F-4468-8EE4-28A6668D006A}" type="datetimeFigureOut">
               <a:rPr lang="en-US" smtClean="0"/>
               <a:pPr/>
-              <a:t>11/25/12</a:t>
+              <a:t>11/28/2012</a:t>
             </a:fld>
             <a:endParaRPr lang="en-US" dirty="0"/>
           </a:p>
@@ -7659,7 +7575,7 @@
             <a:fld id="{B1A24CD3-204F-4468-8EE4-28A6668D006A}" type="datetimeFigureOut">
               <a:rPr lang="en-US" smtClean="0"/>
               <a:pPr/>
-              <a:t>11/25/12</a:t>
+              <a:t>11/28/2012</a:t>
             </a:fld>
             <a:endParaRPr lang="en-US" dirty="0"/>
           </a:p>
@@ -8148,7 +8064,7 @@
             <a:fld id="{B1A24CD3-204F-4468-8EE4-28A6668D006A}" type="datetimeFigureOut">
               <a:rPr lang="en-US" smtClean="0"/>
               <a:pPr/>
-              <a:t>11/25/12</a:t>
+              <a:t>11/28/2012</a:t>
             </a:fld>
             <a:endParaRPr lang="en-US" dirty="0"/>
           </a:p>
@@ -8398,7 +8314,7 @@
             <a:fld id="{B1A24CD3-204F-4468-8EE4-28A6668D006A}" type="datetimeFigureOut">
               <a:rPr lang="en-US" smtClean="0"/>
               <a:pPr/>
-              <a:t>11/25/12</a:t>
+              <a:t>11/28/2012</a:t>
             </a:fld>
             <a:endParaRPr lang="en-US" dirty="0"/>
           </a:p>
@@ -8696,7 +8612,7 @@
             <a:fld id="{B1A24CD3-204F-4468-8EE4-28A6668D006A}" type="datetimeFigureOut">
               <a:rPr lang="en-US" smtClean="0"/>
               <a:pPr/>
-              <a:t>11/25/12</a:t>
+              <a:t>11/28/2012</a:t>
             </a:fld>
             <a:endParaRPr lang="en-US" dirty="0"/>
           </a:p>
@@ -9210,7 +9126,7 @@
     </p:spTree>
     <p:extLst>
       <p:ext uri="{BB962C8B-B14F-4D97-AF65-F5344CB8AC3E}">
-        <p14:creationId xmlns:p14="http://schemas.microsoft.com/office/powerpoint/2010/main" val="3291486969"/>
+        <p14:creationId xmlns:p14="http://schemas.microsoft.com/office/powerpoint/2010/main" xmlns="" val="3291486969"/>
       </p:ext>
     </p:extLst>
   </p:cSld>
@@ -9220,7 +9136,7 @@
   <p:timing>
     <p:tnLst>
       <p:par>
-        <p:cTn xmlns:p14="http://schemas.microsoft.com/office/powerpoint/2010/main" id="1" dur="indefinite" restart="never" nodeType="tmRoot"/>
+        <p:cTn id="1" dur="indefinite" restart="never" nodeType="tmRoot"/>
       </p:par>
     </p:tnLst>
   </p:timing>
@@ -9406,7 +9322,7 @@
     </p:spTree>
     <p:extLst>
       <p:ext uri="{BB962C8B-B14F-4D97-AF65-F5344CB8AC3E}">
-        <p14:creationId xmlns:p14="http://schemas.microsoft.com/office/powerpoint/2010/main" val="3853707377"/>
+        <p14:creationId xmlns:p14="http://schemas.microsoft.com/office/powerpoint/2010/main" xmlns="" val="3853707377"/>
       </p:ext>
     </p:extLst>
   </p:cSld>
@@ -9416,7 +9332,7 @@
   <p:timing>
     <p:tnLst>
       <p:par>
-        <p:cTn xmlns:p14="http://schemas.microsoft.com/office/powerpoint/2010/main" id="1" dur="indefinite" restart="never" nodeType="tmRoot"/>
+        <p:cTn id="1" dur="indefinite" restart="never" nodeType="tmRoot"/>
       </p:par>
     </p:tnLst>
   </p:timing>
@@ -9504,13 +9420,13 @@
           <a:p>
             <a:r>
               <a:rPr lang="en-US" dirty="0" smtClean="0"/>
+              <a:t>Implemented User Stories</a:t>
+            </a:r>
+          </a:p>
+          <a:p>
+            <a:r>
+              <a:rPr lang="en-US" dirty="0" smtClean="0"/>
               <a:t>Demo</a:t>
-            </a:r>
-          </a:p>
-          <a:p>
-            <a:r>
-              <a:rPr lang="en-US" dirty="0" smtClean="0"/>
-              <a:t>Implemented User Stories</a:t>
             </a:r>
           </a:p>
           <a:p>
@@ -9548,7 +9464,7 @@
     </p:spTree>
     <p:extLst>
       <p:ext uri="{BB962C8B-B14F-4D97-AF65-F5344CB8AC3E}">
-        <p14:creationId xmlns:p14="http://schemas.microsoft.com/office/powerpoint/2010/main" val="1633817389"/>
+        <p14:creationId xmlns:p14="http://schemas.microsoft.com/office/powerpoint/2010/main" xmlns="" val="1633817389"/>
       </p:ext>
     </p:extLst>
   </p:cSld>
@@ -9558,7 +9474,7 @@
   <p:timing>
     <p:tnLst>
       <p:par>
-        <p:cTn xmlns:p14="http://schemas.microsoft.com/office/powerpoint/2010/main" id="1" dur="indefinite" restart="never" nodeType="tmRoot"/>
+        <p:cTn id="1" dur="indefinite" restart="never" nodeType="tmRoot"/>
       </p:par>
     </p:tnLst>
   </p:timing>
@@ -9674,7 +9590,6 @@
               <a:rPr lang="en-US" sz="1700" dirty="0"/>
               <a:t>Re-conceptualization of the ‘classic’ course planning system</a:t>
             </a:r>
-            <a:endParaRPr lang="en-US" sz="1700" dirty="0"/>
           </a:p>
           <a:p>
             <a:pPr marL="685800" lvl="1">
@@ -9730,7 +9645,7 @@
           <a:blip r:embed="rId3" cstate="print">
             <a:extLst>
               <a:ext uri="{28A0092B-C50C-407E-A947-70E740481C1C}">
-                <a14:useLocalDpi xmlns:a14="http://schemas.microsoft.com/office/drawing/2010/main" val="0"/>
+                <a14:useLocalDpi xmlns:a14="http://schemas.microsoft.com/office/drawing/2010/main" xmlns="" val="0"/>
               </a:ext>
             </a:extLst>
           </a:blip>
@@ -10022,7 +9937,7 @@
     </p:spTree>
     <p:extLst>
       <p:ext uri="{BB962C8B-B14F-4D97-AF65-F5344CB8AC3E}">
-        <p14:creationId xmlns:p14="http://schemas.microsoft.com/office/powerpoint/2010/main" val="1668180396"/>
+        <p14:creationId xmlns:p14="http://schemas.microsoft.com/office/powerpoint/2010/main" xmlns="" val="1668180396"/>
       </p:ext>
     </p:extLst>
   </p:cSld>
@@ -10032,7 +9947,7 @@
   <p:timing>
     <p:tnLst>
       <p:par>
-        <p:cTn xmlns:p14="http://schemas.microsoft.com/office/powerpoint/2010/main" id="1" dur="indefinite" restart="never" nodeType="tmRoot"/>
+        <p:cTn id="1" dur="indefinite" restart="never" nodeType="tmRoot"/>
       </p:par>
     </p:tnLst>
   </p:timing>
@@ -10056,69 +9971,6 @@
           <a:chExt cx="0" cy="0"/>
         </a:xfrm>
       </p:grpSpPr>
-      <p:pic>
-        <p:nvPicPr>
-          <p:cNvPr id="14338" name="Picture 2" descr="http://1.bp.blogspot.com/-WDaDuF-55Ts/UEeR4724BXI/AAAAAAAAA-A/yEgGwYCJ-3w/s1600/demo.jpg"/>
-          <p:cNvPicPr>
-            <a:picLocks noChangeAspect="1" noChangeArrowheads="1"/>
-          </p:cNvPicPr>
-          <p:nvPr/>
-        </p:nvPicPr>
-        <p:blipFill>
-          <a:blip r:embed="rId3" cstate="print"/>
-          <a:srcRect/>
-          <a:stretch>
-            <a:fillRect/>
-          </a:stretch>
-        </p:blipFill>
-        <p:spPr bwMode="auto">
-          <a:xfrm>
-            <a:off x="1255954" y="1557497"/>
-            <a:ext cx="5361823" cy="3866441"/>
-          </a:xfrm>
-          <a:prstGeom prst="rect">
-            <a:avLst/>
-          </a:prstGeom>
-          <a:noFill/>
-        </p:spPr>
-      </p:pic>
-    </p:spTree>
-    <p:extLst>
-      <p:ext uri="{BB962C8B-B14F-4D97-AF65-F5344CB8AC3E}">
-        <p14:creationId xmlns:p14="http://schemas.microsoft.com/office/powerpoint/2010/main" val="928388685"/>
-      </p:ext>
-    </p:extLst>
-  </p:cSld>
-  <p:clrMapOvr>
-    <a:masterClrMapping/>
-  </p:clrMapOvr>
-  <p:timing>
-    <p:tnLst>
-      <p:par>
-        <p:cTn xmlns:p14="http://schemas.microsoft.com/office/powerpoint/2010/main" id="1" dur="indefinite" restart="never" nodeType="tmRoot"/>
-      </p:par>
-    </p:tnLst>
-  </p:timing>
-</p:sld>
-</file>
-
-<file path=ppt/slides/slide5.xml><?xml version="1.0" encoding="utf-8"?>
-<p:sld xmlns:a="http://schemas.openxmlformats.org/drawingml/2006/main" xmlns:r="http://schemas.openxmlformats.org/officeDocument/2006/relationships" xmlns:p="http://schemas.openxmlformats.org/presentationml/2006/main">
-  <p:cSld>
-    <p:spTree>
-      <p:nvGrpSpPr>
-        <p:cNvPr id="1" name=""/>
-        <p:cNvGrpSpPr/>
-        <p:nvPr/>
-      </p:nvGrpSpPr>
-      <p:grpSpPr>
-        <a:xfrm>
-          <a:off x="0" y="0"/>
-          <a:ext cx="0" cy="0"/>
-          <a:chOff x="0" y="0"/>
-          <a:chExt cx="0" cy="0"/>
-        </a:xfrm>
-      </p:grpSpPr>
       <p:sp>
         <p:nvSpPr>
           <p:cNvPr id="2" name="Title 1"/>
@@ -10146,6 +9998,14 @@
                 </a:solidFill>
               </a:rPr>
               <a:t>User </a:t>
+            </a:r>
+            <a:r>
+              <a:rPr lang="en-US" sz="2400" dirty="0" smtClean="0">
+                <a:solidFill>
+                  <a:srgbClr val="FFFFFF"/>
+                </a:solidFill>
+              </a:rPr>
+              <a:t/>
             </a:r>
             <a:br>
               <a:rPr lang="en-US" sz="2400" dirty="0" smtClean="0">
@@ -10180,7 +10040,7 @@
             <p:ph idx="1"/>
             <p:extLst>
               <p:ext uri="{D42A27DB-BD31-4B8C-83A1-F6EECF244321}">
-                <p14:modId xmlns:p14="http://schemas.microsoft.com/office/powerpoint/2010/main" val="3988399231"/>
+                <p14:modId xmlns:p14="http://schemas.microsoft.com/office/powerpoint/2010/main" xmlns="" val="3988399231"/>
               </p:ext>
             </p:extLst>
           </p:nvPr>
@@ -11346,7 +11206,7 @@
     </p:spTree>
     <p:extLst>
       <p:ext uri="{BB962C8B-B14F-4D97-AF65-F5344CB8AC3E}">
-        <p14:creationId xmlns:p14="http://schemas.microsoft.com/office/powerpoint/2010/main" val="1530510290"/>
+        <p14:creationId xmlns:p14="http://schemas.microsoft.com/office/powerpoint/2010/main" xmlns="" val="1530510290"/>
       </p:ext>
     </p:extLst>
   </p:cSld>
@@ -11356,7 +11216,70 @@
   <p:timing>
     <p:tnLst>
       <p:par>
-        <p:cTn xmlns:p14="http://schemas.microsoft.com/office/powerpoint/2010/main" id="1" dur="indefinite" restart="never" nodeType="tmRoot"/>
+        <p:cTn id="1" dur="indefinite" restart="never" nodeType="tmRoot"/>
+      </p:par>
+    </p:tnLst>
+  </p:timing>
+</p:sld>
+</file>
+
+<file path=ppt/slides/slide5.xml><?xml version="1.0" encoding="utf-8"?>
+<p:sld xmlns:a="http://schemas.openxmlformats.org/drawingml/2006/main" xmlns:r="http://schemas.openxmlformats.org/officeDocument/2006/relationships" xmlns:p="http://schemas.openxmlformats.org/presentationml/2006/main">
+  <p:cSld>
+    <p:spTree>
+      <p:nvGrpSpPr>
+        <p:cNvPr id="1" name=""/>
+        <p:cNvGrpSpPr/>
+        <p:nvPr/>
+      </p:nvGrpSpPr>
+      <p:grpSpPr>
+        <a:xfrm>
+          <a:off x="0" y="0"/>
+          <a:ext cx="0" cy="0"/>
+          <a:chOff x="0" y="0"/>
+          <a:chExt cx="0" cy="0"/>
+        </a:xfrm>
+      </p:grpSpPr>
+      <p:pic>
+        <p:nvPicPr>
+          <p:cNvPr id="14338" name="Picture 2" descr="http://1.bp.blogspot.com/-WDaDuF-55Ts/UEeR4724BXI/AAAAAAAAA-A/yEgGwYCJ-3w/s1600/demo.jpg"/>
+          <p:cNvPicPr>
+            <a:picLocks noChangeAspect="1" noChangeArrowheads="1"/>
+          </p:cNvPicPr>
+          <p:nvPr/>
+        </p:nvPicPr>
+        <p:blipFill>
+          <a:blip r:embed="rId3" cstate="print"/>
+          <a:srcRect/>
+          <a:stretch>
+            <a:fillRect/>
+          </a:stretch>
+        </p:blipFill>
+        <p:spPr bwMode="auto">
+          <a:xfrm>
+            <a:off x="1255954" y="1557497"/>
+            <a:ext cx="5361823" cy="3866441"/>
+          </a:xfrm>
+          <a:prstGeom prst="rect">
+            <a:avLst/>
+          </a:prstGeom>
+          <a:noFill/>
+        </p:spPr>
+      </p:pic>
+    </p:spTree>
+    <p:extLst>
+      <p:ext uri="{BB962C8B-B14F-4D97-AF65-F5344CB8AC3E}">
+        <p14:creationId xmlns:p14="http://schemas.microsoft.com/office/powerpoint/2010/main" xmlns="" val="928388685"/>
+      </p:ext>
+    </p:extLst>
+  </p:cSld>
+  <p:clrMapOvr>
+    <a:masterClrMapping/>
+  </p:clrMapOvr>
+  <p:timing>
+    <p:tnLst>
+      <p:par>
+        <p:cTn id="1" dur="indefinite" restart="never" nodeType="tmRoot"/>
       </p:par>
     </p:tnLst>
   </p:timing>
@@ -11418,7 +11341,7 @@
       </p:sp>
       <p:pic>
         <p:nvPicPr>
-          <p:cNvPr id="10244" name="Picture 4" descr="C:\poori\scu\courses\fall2\sw_engr\project\Component Diagram.jpg"/>
+          <p:cNvPr id="1026" name="Picture 2" descr="C:\poori\scu\courses\fall2\sw_engr\project\Component Diagram.jpg"/>
           <p:cNvPicPr>
             <a:picLocks noChangeAspect="1" noChangeArrowheads="1"/>
           </p:cNvPicPr>
@@ -11433,8 +11356,8 @@
         </p:blipFill>
         <p:spPr bwMode="auto">
           <a:xfrm>
-            <a:off x="-80963" y="-53008"/>
-            <a:ext cx="7444740" cy="7132320"/>
+            <a:off x="1" y="72570"/>
+            <a:ext cx="7384923" cy="6954012"/>
           </a:xfrm>
           <a:prstGeom prst="rect">
             <a:avLst/>
@@ -11445,7 +11368,7 @@
     </p:spTree>
     <p:extLst>
       <p:ext uri="{BB962C8B-B14F-4D97-AF65-F5344CB8AC3E}">
-        <p14:creationId xmlns:p14="http://schemas.microsoft.com/office/powerpoint/2010/main" val="1138632541"/>
+        <p14:creationId xmlns:p14="http://schemas.microsoft.com/office/powerpoint/2010/main" xmlns="" val="1138632541"/>
       </p:ext>
     </p:extLst>
   </p:cSld>
@@ -11455,7 +11378,7 @@
   <p:timing>
     <p:tnLst>
       <p:par>
-        <p:cTn xmlns:p14="http://schemas.microsoft.com/office/powerpoint/2010/main" id="1" dur="indefinite" restart="never" nodeType="tmRoot"/>
+        <p:cTn id="1" dur="indefinite" restart="never" nodeType="tmRoot"/>
       </p:par>
     </p:tnLst>
   </p:timing>
@@ -11704,7 +11627,7 @@
             <p:ph idx="1"/>
             <p:extLst>
               <p:ext uri="{D42A27DB-BD31-4B8C-83A1-F6EECF244321}">
-                <p14:modId xmlns:p14="http://schemas.microsoft.com/office/powerpoint/2010/main" val="2263006737"/>
+                <p14:modId xmlns:p14="http://schemas.microsoft.com/office/powerpoint/2010/main" xmlns="" val="2263006737"/>
               </p:ext>
             </p:extLst>
           </p:nvPr>
@@ -13109,7 +13032,7 @@
     </p:spTree>
     <p:extLst>
       <p:ext uri="{BB962C8B-B14F-4D97-AF65-F5344CB8AC3E}">
-        <p14:creationId xmlns:p14="http://schemas.microsoft.com/office/powerpoint/2010/main" val="1418101890"/>
+        <p14:creationId xmlns:p14="http://schemas.microsoft.com/office/powerpoint/2010/main" xmlns="" val="1418101890"/>
       </p:ext>
     </p:extLst>
   </p:cSld>
@@ -13119,7 +13042,7 @@
   <p:timing>
     <p:tnLst>
       <p:par>
-        <p:cTn xmlns:p14="http://schemas.microsoft.com/office/powerpoint/2010/main" id="1" dur="indefinite" restart="never" nodeType="tmRoot"/>
+        <p:cTn id="1" dur="indefinite" restart="never" nodeType="tmRoot"/>
       </p:par>
     </p:tnLst>
   </p:timing>
@@ -13219,7 +13142,7 @@
             <p:ph idx="1"/>
             <p:extLst>
               <p:ext uri="{D42A27DB-BD31-4B8C-83A1-F6EECF244321}">
-                <p14:modId xmlns:p14="http://schemas.microsoft.com/office/powerpoint/2010/main" val="2952445889"/>
+                <p14:modId xmlns:p14="http://schemas.microsoft.com/office/powerpoint/2010/main" xmlns="" val="2952445889"/>
               </p:ext>
             </p:extLst>
           </p:nvPr>
@@ -14194,7 +14117,7 @@
     </p:spTree>
     <p:extLst>
       <p:ext uri="{BB962C8B-B14F-4D97-AF65-F5344CB8AC3E}">
-        <p14:creationId xmlns:p14="http://schemas.microsoft.com/office/powerpoint/2010/main" val="83792608"/>
+        <p14:creationId xmlns:p14="http://schemas.microsoft.com/office/powerpoint/2010/main" xmlns="" val="83792608"/>
       </p:ext>
     </p:extLst>
   </p:cSld>
@@ -14204,7 +14127,7 @@
   <p:timing>
     <p:tnLst>
       <p:par>
-        <p:cTn xmlns:p14="http://schemas.microsoft.com/office/powerpoint/2010/main" id="1" dur="indefinite" restart="never" nodeType="tmRoot"/>
+        <p:cTn id="1" dur="indefinite" restart="never" nodeType="tmRoot"/>
       </p:par>
     </p:tnLst>
   </p:timing>
@@ -14530,7 +14453,7 @@
     </p:spTree>
     <p:extLst>
       <p:ext uri="{BB962C8B-B14F-4D97-AF65-F5344CB8AC3E}">
-        <p14:creationId xmlns:p14="http://schemas.microsoft.com/office/powerpoint/2010/main" val="1195116925"/>
+        <p14:creationId xmlns:p14="http://schemas.microsoft.com/office/powerpoint/2010/main" xmlns="" val="1195116925"/>
       </p:ext>
     </p:extLst>
   </p:cSld>
@@ -14540,7 +14463,7 @@
   <p:timing>
     <p:tnLst>
       <p:par>
-        <p:cTn xmlns:p14="http://schemas.microsoft.com/office/powerpoint/2010/main" id="1" dur="indefinite" restart="never" nodeType="tmRoot"/>
+        <p:cTn id="1" dur="indefinite" restart="never" nodeType="tmRoot"/>
       </p:par>
     </p:tnLst>
   </p:timing>

</xml_diff>

<commit_message>
removed reference to hibernate in tech challenges
</commit_message>
<xml_diff>
--- a/docs/Presentation_TeamGamma.pptx
+++ b/docs/Presentation_TeamGamma.pptx
@@ -154,7 +154,7 @@
           <c:xMode val="edge"/>
           <c:yMode val="edge"/>
           <c:x val="0.12857427475031"/>
-          <c:y val="0.1384770971425181"/>
+          <c:y val="0.13847709714251813"/>
           <c:w val="0.81610942196581904"/>
           <c:h val="0.73552856740365102"/>
         </c:manualLayout>
@@ -280,16 +280,16 @@
                   <c:v>37</c:v>
                 </c:pt>
                 <c:pt idx="1">
-                  <c:v>35.238095238095291</c:v>
+                  <c:v>35.238095238095305</c:v>
                 </c:pt>
                 <c:pt idx="2">
                   <c:v>33.476190476190446</c:v>
                 </c:pt>
                 <c:pt idx="3">
-                  <c:v>31.71428571428574</c:v>
+                  <c:v>31.714285714285744</c:v>
                 </c:pt>
                 <c:pt idx="4">
-                  <c:v>29.952380952380924</c:v>
+                  <c:v>29.952380952380921</c:v>
                 </c:pt>
                 <c:pt idx="5">
                   <c:v>28.19047619047619</c:v>
@@ -301,10 +301,10 @@
                   <c:v>24.666666666666671</c:v>
                 </c:pt>
                 <c:pt idx="8">
-                  <c:v>22.90476190476188</c:v>
+                  <c:v>22.904761904761877</c:v>
                 </c:pt>
                 <c:pt idx="9">
-                  <c:v>21.142857142857164</c:v>
+                  <c:v>21.142857142857167</c:v>
                 </c:pt>
                 <c:pt idx="10">
                   <c:v>19.38095238095238</c:v>
@@ -313,7 +313,7 @@
                   <c:v>17.619047619047631</c:v>
                 </c:pt>
                 <c:pt idx="12">
-                  <c:v>15.857142857142872</c:v>
+                  <c:v>15.857142857142874</c:v>
                 </c:pt>
                 <c:pt idx="13">
                   <c:v>14.0952380952381</c:v>
@@ -325,7 +325,7 @@
                   <c:v>10.571428571428569</c:v>
                 </c:pt>
                 <c:pt idx="16">
-                  <c:v>8.8095238095238173</c:v>
+                  <c:v>8.8095238095238191</c:v>
                 </c:pt>
                 <c:pt idx="17">
                   <c:v>7.0476190476190466</c:v>
@@ -337,7 +337,7 @@
                   <c:v>3.5238095238095237</c:v>
                 </c:pt>
                 <c:pt idx="20">
-                  <c:v>1.7619047619047599</c:v>
+                  <c:v>1.7619047619047601</c:v>
                 </c:pt>
               </c:numCache>
             </c:numRef>
@@ -526,11 +526,11 @@
           </c:val>
         </c:ser>
         <c:marker val="1"/>
-        <c:axId val="77579008"/>
-        <c:axId val="77581312"/>
+        <c:axId val="75555584"/>
+        <c:axId val="75557888"/>
       </c:lineChart>
       <c:catAx>
-        <c:axId val="77579008"/>
+        <c:axId val="75555584"/>
         <c:scaling>
           <c:orientation val="minMax"/>
         </c:scaling>
@@ -579,13 +579,13 @@
             <a:endParaRPr lang="en-US"/>
           </a:p>
         </c:txPr>
-        <c:crossAx val="77581312"/>
+        <c:crossAx val="75557888"/>
         <c:crosses val="autoZero"/>
         <c:lblAlgn val="ctr"/>
         <c:lblOffset val="100"/>
       </c:catAx>
       <c:valAx>
-        <c:axId val="77581312"/>
+        <c:axId val="75557888"/>
         <c:scaling>
           <c:orientation val="minMax"/>
         </c:scaling>
@@ -641,7 +641,7 @@
             <a:endParaRPr lang="en-US"/>
           </a:p>
         </c:txPr>
-        <c:crossAx val="77579008"/>
+        <c:crossAx val="75555584"/>
         <c:crosses val="autoZero"/>
         <c:crossBetween val="between"/>
       </c:valAx>
@@ -662,7 +662,7 @@
           <c:yMode val="edge"/>
           <c:x val="0.32274203640021693"/>
           <c:y val="0.162826909604848"/>
-          <c:w val="0.67480013709640174"/>
+          <c:w val="0.67480013709640185"/>
           <c:h val="5.8526850766982705E-2"/>
         </c:manualLayout>
       </c:layout>
@@ -724,10 +724,10 @@
           <c:layoutTarget val="inner"/>
           <c:xMode val="edge"/>
           <c:yMode val="edge"/>
-          <c:x val="8.2706842827444879E-2"/>
-          <c:y val="0.17674418604651218"/>
+          <c:x val="8.2706842827444907E-2"/>
+          <c:y val="0.17674418604651224"/>
           <c:w val="0.89661736428843497"/>
-          <c:h val="0.59534883720930343"/>
+          <c:h val="0.59534883720930354"/>
         </c:manualLayout>
       </c:layout>
       <c:lineChart>
@@ -833,34 +833,34 @@
                   <c:v>36.214285714285722</c:v>
                 </c:pt>
                 <c:pt idx="2">
-                  <c:v>33.428571428571466</c:v>
+                  <c:v>33.428571428571473</c:v>
                 </c:pt>
                 <c:pt idx="3">
-                  <c:v>30.642857142857164</c:v>
+                  <c:v>30.642857142857167</c:v>
                 </c:pt>
                 <c:pt idx="4">
-                  <c:v>27.857142857142836</c:v>
+                  <c:v>27.857142857142833</c:v>
                 </c:pt>
                 <c:pt idx="5">
                   <c:v>25.071428571428569</c:v>
                 </c:pt>
                 <c:pt idx="6">
-                  <c:v>22.285714285714253</c:v>
+                  <c:v>22.285714285714246</c:v>
                 </c:pt>
                 <c:pt idx="7">
                   <c:v>19.5</c:v>
                 </c:pt>
                 <c:pt idx="8">
-                  <c:v>16.71428571428574</c:v>
+                  <c:v>16.714285714285744</c:v>
                 </c:pt>
                 <c:pt idx="9">
-                  <c:v>13.928571428571416</c:v>
+                  <c:v>13.928571428571413</c:v>
                 </c:pt>
                 <c:pt idx="10">
-                  <c:v>11.142857142857133</c:v>
+                  <c:v>11.142857142857132</c:v>
                 </c:pt>
                 <c:pt idx="11">
-                  <c:v>8.3571428571428719</c:v>
+                  <c:v>8.3571428571428754</c:v>
                 </c:pt>
                 <c:pt idx="12">
                   <c:v>5.5714285714285703</c:v>
@@ -1013,11 +1013,11 @@
           </c:val>
         </c:ser>
         <c:marker val="1"/>
-        <c:axId val="77649792"/>
-        <c:axId val="78528896"/>
+        <c:axId val="78915456"/>
+        <c:axId val="78930304"/>
       </c:lineChart>
       <c:catAx>
-        <c:axId val="77649792"/>
+        <c:axId val="78915456"/>
         <c:scaling>
           <c:orientation val="minMax"/>
         </c:scaling>
@@ -1066,13 +1066,13 @@
             <a:endParaRPr lang="en-US"/>
           </a:p>
         </c:txPr>
-        <c:crossAx val="78528896"/>
+        <c:crossAx val="78930304"/>
         <c:crosses val="autoZero"/>
         <c:lblAlgn val="ctr"/>
         <c:lblOffset val="100"/>
       </c:catAx>
       <c:valAx>
-        <c:axId val="78528896"/>
+        <c:axId val="78930304"/>
         <c:scaling>
           <c:orientation val="minMax"/>
         </c:scaling>
@@ -1128,7 +1128,7 @@
             <a:endParaRPr lang="en-US"/>
           </a:p>
         </c:txPr>
-        <c:crossAx val="77649792"/>
+        <c:crossAx val="78915456"/>
         <c:crosses val="autoZero"/>
         <c:crossBetween val="between"/>
       </c:valAx>
@@ -1148,7 +1148,7 @@
           <c:xMode val="edge"/>
           <c:yMode val="edge"/>
           <c:x val="0.29369369369369402"/>
-          <c:y val="0.18035428177637522"/>
+          <c:y val="0.18035428177637527"/>
           <c:w val="0.67050689895281701"/>
           <c:h val="5.2135193525473911E-2"/>
         </c:manualLayout>
@@ -1254,7 +1254,7 @@
             <a:fld id="{12CDBA90-CDB2-9846-BC3C-C942DFE4778C}" type="datetimeFigureOut">
               <a:rPr lang="en-US" smtClean="0"/>
               <a:pPr/>
-              <a:t>11/28/2012</a:t>
+              <a:t>11/29/2012</a:t>
             </a:fld>
             <a:endParaRPr lang="en-US" dirty="0"/>
           </a:p>
@@ -1423,7 +1423,7 @@
     </p:spTree>
     <p:extLst>
       <p:ext uri="{BB962C8B-B14F-4D97-AF65-F5344CB8AC3E}">
-        <p14:creationId xmlns="" xmlns:p14="http://schemas.microsoft.com/office/powerpoint/2010/main" val="2212999972"/>
+        <p14:creationId xmlns:p14="http://schemas.microsoft.com/office/powerpoint/2010/main" xmlns="" val="2212999972"/>
       </p:ext>
     </p:extLst>
   </p:cSld>
@@ -1712,7 +1712,7 @@
     </p:spTree>
     <p:extLst>
       <p:ext uri="{BB962C8B-B14F-4D97-AF65-F5344CB8AC3E}">
-        <p14:creationId xmlns="" xmlns:p14="http://schemas.microsoft.com/office/powerpoint/2010/main" val="385254405"/>
+        <p14:creationId xmlns:p14="http://schemas.microsoft.com/office/powerpoint/2010/main" xmlns="" val="385254405"/>
       </p:ext>
     </p:extLst>
   </p:cSld>
@@ -2652,7 +2652,7 @@
             <a:fld id="{B1A24CD3-204F-4468-8EE4-28A6668D006A}" type="datetimeFigureOut">
               <a:rPr lang="en-US" smtClean="0"/>
               <a:pPr/>
-              <a:t>11/28/2012</a:t>
+              <a:t>11/29/2012</a:t>
             </a:fld>
             <a:endParaRPr lang="en-US" dirty="0"/>
           </a:p>
@@ -2940,7 +2940,7 @@
             <a:fld id="{B1A24CD3-204F-4468-8EE4-28A6668D006A}" type="datetimeFigureOut">
               <a:rPr lang="en-US" smtClean="0"/>
               <a:pPr/>
-              <a:t>11/28/2012</a:t>
+              <a:t>11/29/2012</a:t>
             </a:fld>
             <a:endParaRPr lang="en-US" dirty="0"/>
           </a:p>
@@ -3364,7 +3364,7 @@
             <a:fld id="{B1A24CD3-204F-4468-8EE4-28A6668D006A}" type="datetimeFigureOut">
               <a:rPr lang="en-US" smtClean="0"/>
               <a:pPr/>
-              <a:t>11/28/2012</a:t>
+              <a:t>11/29/2012</a:t>
             </a:fld>
             <a:endParaRPr lang="en-US" dirty="0"/>
           </a:p>
@@ -3783,7 +3783,7 @@
             <a:fld id="{B1A24CD3-204F-4468-8EE4-28A6668D006A}" type="datetimeFigureOut">
               <a:rPr lang="en-US" smtClean="0"/>
               <a:pPr/>
-              <a:t>11/28/2012</a:t>
+              <a:t>11/29/2012</a:t>
             </a:fld>
             <a:endParaRPr lang="en-US" dirty="0"/>
           </a:p>
@@ -3918,7 +3918,7 @@
             <a:fld id="{B1A24CD3-204F-4468-8EE4-28A6668D006A}" type="datetimeFigureOut">
               <a:rPr lang="en-US" smtClean="0"/>
               <a:pPr/>
-              <a:t>11/28/2012</a:t>
+              <a:t>11/29/2012</a:t>
             </a:fld>
             <a:endParaRPr lang="en-US" dirty="0"/>
           </a:p>
@@ -4242,7 +4242,7 @@
             <a:fld id="{B1A24CD3-204F-4468-8EE4-28A6668D006A}" type="datetimeFigureOut">
               <a:rPr lang="en-US" smtClean="0"/>
               <a:pPr/>
-              <a:t>11/28/2012</a:t>
+              <a:t>11/29/2012</a:t>
             </a:fld>
             <a:endParaRPr lang="en-US" dirty="0"/>
           </a:p>
@@ -4488,7 +4488,7 @@
             <a:fld id="{B1A24CD3-204F-4468-8EE4-28A6668D006A}" type="datetimeFigureOut">
               <a:rPr lang="en-US" smtClean="0"/>
               <a:pPr/>
-              <a:t>11/28/2012</a:t>
+              <a:t>11/29/2012</a:t>
             </a:fld>
             <a:endParaRPr lang="en-US" dirty="0"/>
           </a:p>
@@ -4828,7 +4828,7 @@
             <a:fld id="{B1A24CD3-204F-4468-8EE4-28A6668D006A}" type="datetimeFigureOut">
               <a:rPr lang="en-US" smtClean="0"/>
               <a:pPr/>
-              <a:t>11/28/2012</a:t>
+              <a:t>11/29/2012</a:t>
             </a:fld>
             <a:endParaRPr lang="en-US" dirty="0"/>
           </a:p>
@@ -5130,7 +5130,7 @@
             <a:fld id="{B1A24CD3-204F-4468-8EE4-28A6668D006A}" type="datetimeFigureOut">
               <a:rPr lang="en-US" smtClean="0"/>
               <a:pPr/>
-              <a:t>11/28/2012</a:t>
+              <a:t>11/29/2012</a:t>
             </a:fld>
             <a:endParaRPr lang="en-US" dirty="0"/>
           </a:p>
@@ -5539,7 +5539,7 @@
             <a:fld id="{B1A24CD3-204F-4468-8EE4-28A6668D006A}" type="datetimeFigureOut">
               <a:rPr lang="en-US" smtClean="0"/>
               <a:pPr/>
-              <a:t>11/28/2012</a:t>
+              <a:t>11/29/2012</a:t>
             </a:fld>
             <a:endParaRPr lang="en-US" dirty="0"/>
           </a:p>
@@ -5763,7 +5763,7 @@
             <a:fld id="{B1A24CD3-204F-4468-8EE4-28A6668D006A}" type="datetimeFigureOut">
               <a:rPr lang="en-US" smtClean="0"/>
               <a:pPr/>
-              <a:t>11/28/2012</a:t>
+              <a:t>11/29/2012</a:t>
             </a:fld>
             <a:endParaRPr lang="en-US" dirty="0"/>
           </a:p>
@@ -5982,7 +5982,7 @@
             <a:fld id="{B1A24CD3-204F-4468-8EE4-28A6668D006A}" type="datetimeFigureOut">
               <a:rPr lang="en-US" smtClean="0"/>
               <a:pPr/>
-              <a:t>11/28/2012</a:t>
+              <a:t>11/29/2012</a:t>
             </a:fld>
             <a:endParaRPr lang="en-US" dirty="0"/>
           </a:p>
@@ -6289,7 +6289,7 @@
             <a:fld id="{B1A24CD3-204F-4468-8EE4-28A6668D006A}" type="datetimeFigureOut">
               <a:rPr lang="en-US" smtClean="0"/>
               <a:pPr/>
-              <a:t>11/28/2012</a:t>
+              <a:t>11/29/2012</a:t>
             </a:fld>
             <a:endParaRPr lang="en-US" dirty="0"/>
           </a:p>
@@ -6618,7 +6618,7 @@
             <a:fld id="{B1A24CD3-204F-4468-8EE4-28A6668D006A}" type="datetimeFigureOut">
               <a:rPr lang="en-US" smtClean="0"/>
               <a:pPr/>
-              <a:t>11/28/2012</a:t>
+              <a:t>11/29/2012</a:t>
             </a:fld>
             <a:endParaRPr lang="en-US" dirty="0"/>
           </a:p>
@@ -6955,7 +6955,7 @@
             <a:fld id="{B1A24CD3-204F-4468-8EE4-28A6668D006A}" type="datetimeFigureOut">
               <a:rPr lang="en-US" smtClean="0"/>
               <a:pPr/>
-              <a:t>11/28/2012</a:t>
+              <a:t>11/29/2012</a:t>
             </a:fld>
             <a:endParaRPr lang="en-US" dirty="0"/>
           </a:p>
@@ -7581,7 +7581,7 @@
             <a:fld id="{B1A24CD3-204F-4468-8EE4-28A6668D006A}" type="datetimeFigureOut">
               <a:rPr lang="en-US" smtClean="0"/>
               <a:pPr/>
-              <a:t>11/28/2012</a:t>
+              <a:t>11/29/2012</a:t>
             </a:fld>
             <a:endParaRPr lang="en-US" dirty="0"/>
           </a:p>
@@ -8070,7 +8070,7 @@
             <a:fld id="{B1A24CD3-204F-4468-8EE4-28A6668D006A}" type="datetimeFigureOut">
               <a:rPr lang="en-US" smtClean="0"/>
               <a:pPr/>
-              <a:t>11/28/2012</a:t>
+              <a:t>11/29/2012</a:t>
             </a:fld>
             <a:endParaRPr lang="en-US" dirty="0"/>
           </a:p>
@@ -8320,7 +8320,7 @@
             <a:fld id="{B1A24CD3-204F-4468-8EE4-28A6668D006A}" type="datetimeFigureOut">
               <a:rPr lang="en-US" smtClean="0"/>
               <a:pPr/>
-              <a:t>11/28/2012</a:t>
+              <a:t>11/29/2012</a:t>
             </a:fld>
             <a:endParaRPr lang="en-US" dirty="0"/>
           </a:p>
@@ -8618,7 +8618,7 @@
             <a:fld id="{B1A24CD3-204F-4468-8EE4-28A6668D006A}" type="datetimeFigureOut">
               <a:rPr lang="en-US" smtClean="0"/>
               <a:pPr/>
-              <a:t>11/28/2012</a:t>
+              <a:t>11/29/2012</a:t>
             </a:fld>
             <a:endParaRPr lang="en-US" dirty="0"/>
           </a:p>
@@ -9132,7 +9132,7 @@
     </p:spTree>
     <p:extLst>
       <p:ext uri="{BB962C8B-B14F-4D97-AF65-F5344CB8AC3E}">
-        <p14:creationId xmlns="" xmlns:p14="http://schemas.microsoft.com/office/powerpoint/2010/main" val="3291486969"/>
+        <p14:creationId xmlns:p14="http://schemas.microsoft.com/office/powerpoint/2010/main" xmlns="" val="3291486969"/>
       </p:ext>
     </p:extLst>
   </p:cSld>
@@ -9260,15 +9260,12 @@
           <a:p>
             <a:pPr lvl="1"/>
             <a:r>
-              <a:rPr lang="en-US" dirty="0"/>
-              <a:t>Hibernate for Object-Relational Mapping</a:t>
-            </a:r>
-          </a:p>
-          <a:p>
-            <a:pPr lvl="1"/>
-            <a:r>
               <a:rPr lang="en-US" dirty="0" smtClean="0"/>
-              <a:t>High (re)learning curve</a:t>
+              <a:t>High </a:t>
+            </a:r>
+            <a:r>
+              <a:rPr lang="en-US" dirty="0" smtClean="0"/>
+              <a:t>(re)learning curve</a:t>
             </a:r>
           </a:p>
           <a:p>
@@ -9328,7 +9325,7 @@
     </p:spTree>
     <p:extLst>
       <p:ext uri="{BB962C8B-B14F-4D97-AF65-F5344CB8AC3E}">
-        <p14:creationId xmlns="" xmlns:p14="http://schemas.microsoft.com/office/powerpoint/2010/main" val="3853707377"/>
+        <p14:creationId xmlns:p14="http://schemas.microsoft.com/office/powerpoint/2010/main" xmlns="" val="3853707377"/>
       </p:ext>
     </p:extLst>
   </p:cSld>
@@ -9470,7 +9467,7 @@
     </p:spTree>
     <p:extLst>
       <p:ext uri="{BB962C8B-B14F-4D97-AF65-F5344CB8AC3E}">
-        <p14:creationId xmlns="" xmlns:p14="http://schemas.microsoft.com/office/powerpoint/2010/main" val="1633817389"/>
+        <p14:creationId xmlns:p14="http://schemas.microsoft.com/office/powerpoint/2010/main" xmlns="" val="1633817389"/>
       </p:ext>
     </p:extLst>
   </p:cSld>
@@ -9651,7 +9648,7 @@
           <a:blip r:embed="rId3" cstate="print">
             <a:extLst>
               <a:ext uri="{28A0092B-C50C-407E-A947-70E740481C1C}">
-                <a14:useLocalDpi xmlns="" xmlns:a14="http://schemas.microsoft.com/office/drawing/2010/main" val="0"/>
+                <a14:useLocalDpi xmlns:a14="http://schemas.microsoft.com/office/drawing/2010/main" xmlns="" val="0"/>
               </a:ext>
             </a:extLst>
           </a:blip>
@@ -9943,7 +9940,7 @@
     </p:spTree>
     <p:extLst>
       <p:ext uri="{BB962C8B-B14F-4D97-AF65-F5344CB8AC3E}">
-        <p14:creationId xmlns="" xmlns:p14="http://schemas.microsoft.com/office/powerpoint/2010/main" val="1668180396"/>
+        <p14:creationId xmlns:p14="http://schemas.microsoft.com/office/powerpoint/2010/main" xmlns="" val="1668180396"/>
       </p:ext>
     </p:extLst>
   </p:cSld>
@@ -10038,7 +10035,7 @@
             <p:ph idx="1"/>
             <p:extLst>
               <p:ext uri="{D42A27DB-BD31-4B8C-83A1-F6EECF244321}">
-                <p14:modId xmlns="" xmlns:p14="http://schemas.microsoft.com/office/powerpoint/2010/main" val="3988399231"/>
+                <p14:modId xmlns:p14="http://schemas.microsoft.com/office/powerpoint/2010/main" xmlns="" val="3988399231"/>
               </p:ext>
             </p:extLst>
           </p:nvPr>
@@ -11204,7 +11201,7 @@
     </p:spTree>
     <p:extLst>
       <p:ext uri="{BB962C8B-B14F-4D97-AF65-F5344CB8AC3E}">
-        <p14:creationId xmlns="" xmlns:p14="http://schemas.microsoft.com/office/powerpoint/2010/main" val="1530510290"/>
+        <p14:creationId xmlns:p14="http://schemas.microsoft.com/office/powerpoint/2010/main" xmlns="" val="1530510290"/>
       </p:ext>
     </p:extLst>
   </p:cSld>
@@ -11267,7 +11264,7 @@
     </p:spTree>
     <p:extLst>
       <p:ext uri="{BB962C8B-B14F-4D97-AF65-F5344CB8AC3E}">
-        <p14:creationId xmlns="" xmlns:p14="http://schemas.microsoft.com/office/powerpoint/2010/main" val="928388685"/>
+        <p14:creationId xmlns:p14="http://schemas.microsoft.com/office/powerpoint/2010/main" xmlns="" val="928388685"/>
       </p:ext>
     </p:extLst>
   </p:cSld>
@@ -11366,7 +11363,7 @@
     </p:spTree>
     <p:extLst>
       <p:ext uri="{BB962C8B-B14F-4D97-AF65-F5344CB8AC3E}">
-        <p14:creationId xmlns="" xmlns:p14="http://schemas.microsoft.com/office/powerpoint/2010/main" val="1138632541"/>
+        <p14:creationId xmlns:p14="http://schemas.microsoft.com/office/powerpoint/2010/main" xmlns="" val="1138632541"/>
       </p:ext>
     </p:extLst>
   </p:cSld>
@@ -11625,7 +11622,7 @@
             <p:ph idx="1"/>
             <p:extLst>
               <p:ext uri="{D42A27DB-BD31-4B8C-83A1-F6EECF244321}">
-                <p14:modId xmlns="" xmlns:p14="http://schemas.microsoft.com/office/powerpoint/2010/main" val="2263006737"/>
+                <p14:modId xmlns:p14="http://schemas.microsoft.com/office/powerpoint/2010/main" xmlns="" val="2263006737"/>
               </p:ext>
             </p:extLst>
           </p:nvPr>
@@ -13030,7 +13027,7 @@
     </p:spTree>
     <p:extLst>
       <p:ext uri="{BB962C8B-B14F-4D97-AF65-F5344CB8AC3E}">
-        <p14:creationId xmlns="" xmlns:p14="http://schemas.microsoft.com/office/powerpoint/2010/main" val="1418101890"/>
+        <p14:creationId xmlns:p14="http://schemas.microsoft.com/office/powerpoint/2010/main" xmlns="" val="1418101890"/>
       </p:ext>
     </p:extLst>
   </p:cSld>
@@ -13140,7 +13137,7 @@
             <p:ph idx="1"/>
             <p:extLst>
               <p:ext uri="{D42A27DB-BD31-4B8C-83A1-F6EECF244321}">
-                <p14:modId xmlns="" xmlns:p14="http://schemas.microsoft.com/office/powerpoint/2010/main" val="2952445889"/>
+                <p14:modId xmlns:p14="http://schemas.microsoft.com/office/powerpoint/2010/main" xmlns="" val="2952445889"/>
               </p:ext>
             </p:extLst>
           </p:nvPr>
@@ -14115,7 +14112,7 @@
     </p:spTree>
     <p:extLst>
       <p:ext uri="{BB962C8B-B14F-4D97-AF65-F5344CB8AC3E}">
-        <p14:creationId xmlns="" xmlns:p14="http://schemas.microsoft.com/office/powerpoint/2010/main" val="83792608"/>
+        <p14:creationId xmlns:p14="http://schemas.microsoft.com/office/powerpoint/2010/main" xmlns="" val="83792608"/>
       </p:ext>
     </p:extLst>
   </p:cSld>
@@ -14451,7 +14448,7 @@
     </p:spTree>
     <p:extLst>
       <p:ext uri="{BB962C8B-B14F-4D97-AF65-F5344CB8AC3E}">
-        <p14:creationId xmlns="" xmlns:p14="http://schemas.microsoft.com/office/powerpoint/2010/main" val="1195116925"/>
+        <p14:creationId xmlns:p14="http://schemas.microsoft.com/office/powerpoint/2010/main" xmlns="" val="1195116925"/>
       </p:ext>
     </p:extLst>
   </p:cSld>

</xml_diff>